<commit_message>
Presentation improvements / slides reordering for Gdansk meeting
</commit_message>
<xml_diff>
--- a/presentation.pptx
+++ b/presentation.pptx
@@ -13,12 +13,12 @@
     <p:sldId id="260" r:id="rId5"/>
     <p:sldId id="262" r:id="rId6"/>
     <p:sldId id="261" r:id="rId7"/>
-    <p:sldId id="259" r:id="rId8"/>
-    <p:sldId id="264" r:id="rId9"/>
-    <p:sldId id="265" r:id="rId10"/>
+    <p:sldId id="265" r:id="rId8"/>
+    <p:sldId id="259" r:id="rId9"/>
+    <p:sldId id="264" r:id="rId10"/>
     <p:sldId id="257" r:id="rId11"/>
-    <p:sldId id="267" r:id="rId12"/>
-    <p:sldId id="266" r:id="rId13"/>
+    <p:sldId id="266" r:id="rId12"/>
+    <p:sldId id="267" r:id="rId13"/>
     <p:sldId id="269" r:id="rId14"/>
     <p:sldId id="270" r:id="rId15"/>
     <p:sldId id="271" r:id="rId16"/>
@@ -2886,7 +2886,7 @@
           <a:p>
             <a:fld id="{E0FD4FC0-A908-4AF9-A685-AE949B61EE1D}" type="datetimeFigureOut">
               <a:rPr lang="pl-PL" smtClean="0"/>
-              <a:t>2013-01-15</a:t>
+              <a:t>2013-02-10</a:t>
             </a:fld>
             <a:endParaRPr lang="pl-PL"/>
           </a:p>
@@ -3442,163 +3442,15 @@
             </a:pPr>
             <a:r>
               <a:rPr lang="pl-PL" baseline="0" dirty="0" smtClean="0"/>
-              <a:t>Wysoki poziom abstrakcji - </a:t>
-            </a:r>
-            <a:r>
-              <a:rPr lang="pl-PL" sz="1200" b="0" i="0" kern="1200" dirty="0" smtClean="0">
-                <a:solidFill>
-                  <a:schemeClr val="tx1"/>
-                </a:solidFill>
-                <a:effectLst/>
-                <a:latin typeface="+mn-lt"/>
-                <a:ea typeface="+mn-ea"/>
-                <a:cs typeface="+mn-cs"/>
-              </a:rPr>
-              <a:t>Pojedyncza operacja powinna zwykle wykonać wiele akcji na driverze np. </a:t>
-            </a:r>
-            <a:r>
-              <a:rPr lang="pl-PL" sz="1200" b="0" i="0" kern="1200" dirty="0" err="1" smtClean="0">
-                <a:solidFill>
-                  <a:schemeClr val="tx1"/>
-                </a:solidFill>
-                <a:effectLst/>
-                <a:latin typeface="+mn-lt"/>
-                <a:ea typeface="+mn-ea"/>
-                <a:cs typeface="+mn-cs"/>
-              </a:rPr>
-              <a:t>Fill</a:t>
-            </a:r>
-            <a:r>
-              <a:rPr lang="pl-PL" sz="1200" b="0" i="0" kern="1200" dirty="0" smtClean="0">
-                <a:solidFill>
-                  <a:schemeClr val="tx1"/>
-                </a:solidFill>
-                <a:effectLst/>
-                <a:latin typeface="+mn-lt"/>
-                <a:ea typeface="+mn-ea"/>
-                <a:cs typeface="+mn-cs"/>
-              </a:rPr>
-              <a:t> </a:t>
-            </a:r>
-            <a:r>
-              <a:rPr lang="pl-PL" sz="1200" b="0" i="0" kern="1200" dirty="0" err="1" smtClean="0">
-                <a:solidFill>
-                  <a:schemeClr val="tx1"/>
-                </a:solidFill>
-                <a:effectLst/>
-                <a:latin typeface="+mn-lt"/>
-                <a:ea typeface="+mn-ea"/>
-                <a:cs typeface="+mn-cs"/>
-              </a:rPr>
-              <a:t>InAddress</a:t>
-            </a:r>
-            <a:r>
-              <a:rPr lang="pl-PL" sz="1200" b="0" i="0" kern="1200" dirty="0" smtClean="0">
-                <a:solidFill>
-                  <a:schemeClr val="tx1"/>
-                </a:solidFill>
-                <a:effectLst/>
-                <a:latin typeface="+mn-lt"/>
-                <a:ea typeface="+mn-ea"/>
-                <a:cs typeface="+mn-cs"/>
-              </a:rPr>
-              <a:t>(…) zamiast FillInStreetLine1(…), </a:t>
-            </a:r>
-            <a:r>
-              <a:rPr lang="pl-PL" sz="1200" b="0" i="0" kern="1200" dirty="0" err="1" smtClean="0">
-                <a:solidFill>
-                  <a:schemeClr val="tx1"/>
-                </a:solidFill>
-                <a:effectLst/>
-                <a:latin typeface="+mn-lt"/>
-                <a:ea typeface="+mn-ea"/>
-                <a:cs typeface="+mn-cs"/>
-              </a:rPr>
-              <a:t>FillInZipCode</a:t>
-            </a:r>
-            <a:r>
-              <a:rPr lang="pl-PL" sz="1200" b="0" i="0" kern="1200" dirty="0" smtClean="0">
-                <a:solidFill>
-                  <a:schemeClr val="tx1"/>
-                </a:solidFill>
-                <a:effectLst/>
-                <a:latin typeface="+mn-lt"/>
-                <a:ea typeface="+mn-ea"/>
-                <a:cs typeface="+mn-cs"/>
-              </a:rPr>
-              <a:t>(…). Jeden przycisk Login na stronie może mieć różne zachowanie zależnie od podanych na stronie wartości, dlatego w PO może pojawić się dla niego wiele metod: </a:t>
-            </a:r>
-            <a:r>
-              <a:rPr lang="pl-PL" sz="1200" b="0" i="0" kern="1200" dirty="0" err="1" smtClean="0">
-                <a:solidFill>
-                  <a:schemeClr val="tx1"/>
-                </a:solidFill>
-                <a:effectLst/>
-                <a:latin typeface="+mn-lt"/>
-                <a:ea typeface="+mn-ea"/>
-                <a:cs typeface="+mn-cs"/>
-              </a:rPr>
-              <a:t>LoginAsCorrectCustomer</a:t>
-            </a:r>
-            <a:r>
-              <a:rPr lang="pl-PL" sz="1200" b="0" i="0" kern="1200" dirty="0" smtClean="0">
-                <a:solidFill>
-                  <a:schemeClr val="tx1"/>
-                </a:solidFill>
-                <a:effectLst/>
-                <a:latin typeface="+mn-lt"/>
-                <a:ea typeface="+mn-ea"/>
-                <a:cs typeface="+mn-cs"/>
-              </a:rPr>
-              <a:t>, </a:t>
-            </a:r>
-            <a:r>
-              <a:rPr lang="pl-PL" sz="1200" b="0" i="0" kern="1200" dirty="0" err="1" smtClean="0">
-                <a:solidFill>
-                  <a:schemeClr val="tx1"/>
-                </a:solidFill>
-                <a:effectLst/>
-                <a:latin typeface="+mn-lt"/>
-                <a:ea typeface="+mn-ea"/>
-                <a:cs typeface="+mn-cs"/>
-              </a:rPr>
-              <a:t>LoginAsRegionAdministrator</a:t>
-            </a:r>
-            <a:r>
-              <a:rPr lang="pl-PL" sz="1200" b="0" i="0" kern="1200" dirty="0" smtClean="0">
-                <a:solidFill>
-                  <a:schemeClr val="tx1"/>
-                </a:solidFill>
-                <a:effectLst/>
-                <a:latin typeface="+mn-lt"/>
-                <a:ea typeface="+mn-ea"/>
-                <a:cs typeface="+mn-cs"/>
-              </a:rPr>
-              <a:t>(region), </a:t>
-            </a:r>
-            <a:r>
-              <a:rPr lang="pl-PL" sz="1200" b="0" i="0" kern="1200" dirty="0" err="1" smtClean="0">
-                <a:solidFill>
-                  <a:schemeClr val="tx1"/>
-                </a:solidFill>
-                <a:effectLst/>
-                <a:latin typeface="+mn-lt"/>
-                <a:ea typeface="+mn-ea"/>
-                <a:cs typeface="+mn-cs"/>
-              </a:rPr>
-              <a:t>LoginWithRole</a:t>
-            </a:r>
-            <a:r>
-              <a:rPr lang="pl-PL" sz="1200" b="0" i="0" kern="1200" dirty="0" smtClean="0">
-                <a:solidFill>
-                  <a:schemeClr val="tx1"/>
-                </a:solidFill>
-                <a:effectLst/>
-                <a:latin typeface="+mn-lt"/>
-                <a:ea typeface="+mn-ea"/>
-                <a:cs typeface="+mn-cs"/>
-              </a:rPr>
-              <a:t>(role) itp. Które mają różną logikę oraz mogą zwracać różne PO na wyjściu</a:t>
+              <a:t>Pierwszy PO posiada dedykowane metody, które bezpośrednio korzystają z sterownika celem </a:t>
+            </a:r>
+            <a:r>
+              <a:rPr lang="pl-PL" baseline="0" dirty="0" err="1" smtClean="0"/>
+              <a:t>slekcji</a:t>
+            </a:r>
+            <a:r>
+              <a:rPr lang="pl-PL" baseline="0" dirty="0" smtClean="0"/>
+              <a:t> elementów</a:t>
             </a:r>
           </a:p>
           <a:p>
@@ -3606,81 +3458,135 @@
               <a:buAutoNum type="arabicParenR"/>
             </a:pPr>
             <a:r>
-              <a:rPr lang="pl-PL" sz="1200" b="0" i="0" kern="1200" dirty="0" err="1" smtClean="0">
-                <a:solidFill>
-                  <a:schemeClr val="tx1"/>
-                </a:solidFill>
-                <a:effectLst/>
-                <a:latin typeface="+mn-lt"/>
-                <a:ea typeface="+mn-ea"/>
-                <a:cs typeface="+mn-cs"/>
-              </a:rPr>
-              <a:t>Fluent</a:t>
-            </a:r>
-            <a:r>
-              <a:rPr lang="pl-PL" sz="1200" b="0" i="0" kern="1200" dirty="0" smtClean="0">
-                <a:solidFill>
-                  <a:schemeClr val="tx1"/>
-                </a:solidFill>
-                <a:effectLst/>
-                <a:latin typeface="+mn-lt"/>
-                <a:ea typeface="+mn-ea"/>
-                <a:cs typeface="+mn-cs"/>
-              </a:rPr>
+              <a:rPr lang="en-US" baseline="0" dirty="0" smtClean="0"/>
+              <a:t>W </a:t>
+            </a:r>
+            <a:r>
+              <a:rPr lang="en-US" baseline="0" dirty="0" err="1" smtClean="0"/>
+              <a:t>kolejnej</a:t>
+            </a:r>
+            <a:r>
+              <a:rPr lang="en-US" baseline="0" dirty="0" smtClean="0"/>
               <a:t> </a:t>
             </a:r>
             <a:r>
-              <a:rPr lang="pl-PL" sz="1200" b="0" i="0" kern="1200" dirty="0" err="1" smtClean="0">
-                <a:solidFill>
-                  <a:schemeClr val="tx1"/>
-                </a:solidFill>
-                <a:effectLst/>
-                <a:latin typeface="+mn-lt"/>
-                <a:ea typeface="+mn-ea"/>
-                <a:cs typeface="+mn-cs"/>
-              </a:rPr>
-              <a:t>kłopotiliwy</a:t>
-            </a:r>
-            <a:r>
-              <a:rPr lang="pl-PL" sz="1200" b="0" i="0" kern="1200" baseline="0" dirty="0" smtClean="0">
-                <a:solidFill>
-                  <a:schemeClr val="tx1"/>
-                </a:solidFill>
-                <a:effectLst/>
-                <a:latin typeface="+mn-lt"/>
-                <a:ea typeface="+mn-ea"/>
-                <a:cs typeface="+mn-cs"/>
-              </a:rPr>
-              <a:t> w debugowaniu </a:t>
-            </a:r>
-            <a:r>
-              <a:rPr lang="pl-PL" sz="1200" b="0" i="0" kern="1200" dirty="0" smtClean="0">
-                <a:solidFill>
-                  <a:schemeClr val="tx1"/>
-                </a:solidFill>
-                <a:effectLst/>
-                <a:latin typeface="+mn-lt"/>
-                <a:ea typeface="+mn-ea"/>
-                <a:cs typeface="+mn-cs"/>
-              </a:rPr>
-              <a:t>- używaj z rozwagą tylko w obrębie jednej strony, przy interakcji nazywaj explicite zmienną</a:t>
-            </a:r>
+              <a:rPr lang="en-US" baseline="0" dirty="0" err="1" smtClean="0"/>
+              <a:t>wersji</a:t>
+            </a:r>
+            <a:r>
+              <a:rPr lang="en-US" baseline="0" dirty="0" smtClean="0"/>
+              <a:t> </a:t>
+            </a:r>
+            <a:r>
+              <a:rPr lang="en-US" baseline="0" dirty="0" err="1" smtClean="0"/>
+              <a:t>dodajemy</a:t>
+            </a:r>
+            <a:r>
+              <a:rPr lang="en-US" baseline="0" dirty="0" smtClean="0"/>
+              <a:t> </a:t>
+            </a:r>
+            <a:r>
+              <a:rPr lang="pl-PL" baseline="0" dirty="0" smtClean="0"/>
+              <a:t>właściwości </a:t>
+            </a:r>
+            <a:r>
+              <a:rPr lang="pl-PL" baseline="0" dirty="0" smtClean="0"/>
+              <a:t>celem uniknięcia </a:t>
+            </a:r>
+            <a:r>
+              <a:rPr lang="pl-PL" baseline="0" dirty="0" smtClean="0"/>
+              <a:t>duplikacji</a:t>
+            </a:r>
+            <a:r>
+              <a:rPr lang="en-US" baseline="0" dirty="0" smtClean="0"/>
+              <a:t> </a:t>
+            </a:r>
+            <a:r>
+              <a:rPr lang="en-US" baseline="0" dirty="0" err="1" smtClean="0"/>
+              <a:t>odwołań</a:t>
+            </a:r>
+            <a:r>
+              <a:rPr lang="en-US" baseline="0" dirty="0" smtClean="0"/>
+              <a:t> do </a:t>
+            </a:r>
+            <a:r>
+              <a:rPr lang="en-US" baseline="0" dirty="0" err="1" smtClean="0"/>
+              <a:t>Drivera</a:t>
+            </a:r>
+            <a:endParaRPr lang="pl-PL" baseline="0" dirty="0" smtClean="0"/>
           </a:p>
           <a:p>
             <a:pPr marL="228600" indent="-228600">
               <a:buAutoNum type="arabicParenR"/>
             </a:pPr>
             <a:r>
-              <a:rPr lang="pl-PL" sz="1200" b="0" i="0" kern="1200" dirty="0" smtClean="0">
-                <a:solidFill>
-                  <a:schemeClr val="tx1"/>
-                </a:solidFill>
-                <a:effectLst/>
-                <a:latin typeface="+mn-lt"/>
-                <a:ea typeface="+mn-ea"/>
-                <a:cs typeface="+mn-cs"/>
-              </a:rPr>
-              <a:t>Jako, że PO to klasy to użyteczne jest dla nich zastosowanie koncepcji OOP</a:t>
+              <a:rPr lang="pl-PL" strike="sngStrike" baseline="0" dirty="0" smtClean="0"/>
+              <a:t>W </a:t>
+            </a:r>
+            <a:r>
+              <a:rPr lang="en-US" strike="sngStrike" baseline="0" dirty="0" err="1" smtClean="0"/>
+              <a:t>dalszej</a:t>
+            </a:r>
+            <a:r>
+              <a:rPr lang="en-US" strike="sngStrike" baseline="0" dirty="0" smtClean="0"/>
+              <a:t> </a:t>
+            </a:r>
+            <a:r>
+              <a:rPr lang="en-US" strike="sngStrike" baseline="0" dirty="0" err="1" smtClean="0"/>
+              <a:t>kolejności</a:t>
+            </a:r>
+            <a:r>
+              <a:rPr lang="en-US" strike="sngStrike" baseline="0" dirty="0" smtClean="0"/>
+              <a:t> </a:t>
+            </a:r>
+            <a:r>
+              <a:rPr lang="pl-PL" strike="sngStrike" baseline="0" dirty="0" smtClean="0"/>
+              <a:t>pokazujemy </a:t>
+            </a:r>
+            <a:r>
+              <a:rPr lang="pl-PL" strike="sngStrike" baseline="0" dirty="0" smtClean="0"/>
+              <a:t>jak wykorzystać </a:t>
+            </a:r>
+            <a:r>
+              <a:rPr lang="pl-PL" strike="sngStrike" baseline="0" dirty="0" err="1" smtClean="0"/>
+              <a:t>PageFactory</a:t>
+            </a:r>
+            <a:r>
+              <a:rPr lang="pl-PL" strike="sngStrike" baseline="0" dirty="0" smtClean="0"/>
+              <a:t> do dalszego uproszczenia </a:t>
+            </a:r>
+            <a:r>
+              <a:rPr lang="pl-PL" strike="sngStrike" baseline="0" dirty="0" err="1" smtClean="0"/>
+              <a:t>Page</a:t>
+            </a:r>
+            <a:r>
+              <a:rPr lang="pl-PL" strike="sngStrike" baseline="0" dirty="0" smtClean="0"/>
+              <a:t> </a:t>
+            </a:r>
+            <a:r>
+              <a:rPr lang="pl-PL" strike="sngStrike" baseline="0" dirty="0" err="1" smtClean="0"/>
+              <a:t>Objectu</a:t>
+            </a:r>
+            <a:r>
+              <a:rPr lang="pl-PL" strike="sngStrike" baseline="0" dirty="0" smtClean="0"/>
+              <a:t> </a:t>
+            </a:r>
+          </a:p>
+          <a:p>
+            <a:pPr marL="0" indent="0">
+              <a:buNone/>
+            </a:pPr>
+            <a:r>
+              <a:rPr lang="pl-PL" baseline="0" dirty="0" smtClean="0"/>
+              <a:t>4) Problemy z </a:t>
+            </a:r>
+            <a:r>
+              <a:rPr lang="pl-PL" baseline="0" dirty="0" err="1" smtClean="0"/>
+              <a:t>PageFactory</a:t>
+            </a:r>
+            <a:r>
+              <a:rPr lang="pl-PL" baseline="0" dirty="0" smtClean="0"/>
+              <a:t> wykryte podczas ewaluacji</a:t>
             </a:r>
           </a:p>
           <a:p>
@@ -3688,16 +3594,14 @@
               <a:buAutoNum type="arabicParenR"/>
             </a:pPr>
             <a:r>
-              <a:rPr lang="pl-PL" sz="1200" b="0" i="0" kern="1200" dirty="0" smtClean="0">
-                <a:solidFill>
-                  <a:schemeClr val="tx1"/>
-                </a:solidFill>
-                <a:effectLst/>
-                <a:latin typeface="+mn-lt"/>
-                <a:ea typeface="+mn-ea"/>
-                <a:cs typeface="+mn-cs"/>
-              </a:rPr>
-              <a:t>Bazowa klasa PO - np. sprawdzenia poprawności  tytułu/lokacji aktualnej strony drivera, czy </a:t>
+              <a:rPr lang="pl-PL" baseline="0" dirty="0" smtClean="0"/>
+              <a:t>Wywołane za wcześnie potrafi nie działać </a:t>
+            </a:r>
+            <a:r>
+              <a:rPr lang="pl-PL" baseline="0" dirty="0" smtClean="0">
+                <a:sym typeface="Wingdings" pitchFamily="2" charset="2"/>
+              </a:rPr>
+              <a:t></a:t>
             </a:r>
           </a:p>
           <a:p>
@@ -3705,40 +3609,22 @@
               <a:buAutoNum type="arabicParenR"/>
             </a:pPr>
             <a:r>
-              <a:rPr lang="pl-PL" sz="1200" b="0" i="0" kern="1200" dirty="0" smtClean="0">
-                <a:solidFill>
-                  <a:schemeClr val="tx1"/>
-                </a:solidFill>
-                <a:effectLst/>
-                <a:latin typeface="+mn-lt"/>
-                <a:ea typeface="+mn-ea"/>
-                <a:cs typeface="+mn-cs"/>
-              </a:rPr>
-              <a:t>Jeśli strona reprezentuje różne zachowanie np. dla różnych  użytkowników (np. dla zwykłych użytkowników tylko do odczytu a dla administratora</a:t>
-            </a:r>
-            <a:r>
-              <a:rPr lang="pl-PL" sz="1200" b="0" i="0" kern="1200" baseline="0" dirty="0" smtClean="0">
-                <a:solidFill>
-                  <a:schemeClr val="tx1"/>
-                </a:solidFill>
-                <a:effectLst/>
-                <a:latin typeface="+mn-lt"/>
-                <a:ea typeface="+mn-ea"/>
-                <a:cs typeface="+mn-cs"/>
-              </a:rPr>
-              <a:t> </a:t>
-            </a:r>
-            <a:r>
-              <a:rPr lang="pl-PL" sz="1200" b="0" i="0" kern="1200" dirty="0" smtClean="0">
-                <a:solidFill>
-                  <a:schemeClr val="tx1"/>
-                </a:solidFill>
-                <a:effectLst/>
-                <a:latin typeface="+mn-lt"/>
-                <a:ea typeface="+mn-ea"/>
-                <a:cs typeface="+mn-cs"/>
-              </a:rPr>
-              <a:t>możliwość zapisu) to warto pomyśleć o oddzielnych PO z być może wspólną klasą bazową (poza w/w)</a:t>
+              <a:rPr lang="pl-PL" baseline="0" dirty="0" smtClean="0">
+                <a:sym typeface="Wingdings" pitchFamily="2" charset="2"/>
+              </a:rPr>
+              <a:t>Nie działa dla kolekcji </a:t>
+            </a:r>
+            <a:r>
+              <a:rPr lang="pl-PL" baseline="0" dirty="0" err="1" smtClean="0">
+                <a:sym typeface="Wingdings" pitchFamily="2" charset="2"/>
+              </a:rPr>
+              <a:t>IWebElementów</a:t>
+            </a:r>
+            <a:r>
+              <a:rPr lang="pl-PL" baseline="0" dirty="0" smtClean="0">
+                <a:sym typeface="Wingdings" pitchFamily="2" charset="2"/>
+              </a:rPr>
+              <a:t> (wersja C#)</a:t>
             </a:r>
           </a:p>
           <a:p>
@@ -3746,70 +3632,87 @@
               <a:buAutoNum type="arabicParenR"/>
             </a:pPr>
             <a:r>
-              <a:rPr lang="pl-PL" sz="1200" b="0" i="0" kern="1200" dirty="0" smtClean="0">
-                <a:solidFill>
-                  <a:schemeClr val="tx1"/>
-                </a:solidFill>
-                <a:effectLst/>
-                <a:latin typeface="+mn-lt"/>
-                <a:ea typeface="+mn-ea"/>
-                <a:cs typeface="+mn-cs"/>
-              </a:rPr>
-              <a:t>Kompozycja przydatna dla komponentów/</a:t>
-            </a:r>
-            <a:r>
-              <a:rPr lang="pl-PL" sz="1200" b="0" i="0" kern="1200" dirty="0" err="1" smtClean="0">
-                <a:solidFill>
-                  <a:schemeClr val="tx1"/>
-                </a:solidFill>
-                <a:effectLst/>
-                <a:latin typeface="+mn-lt"/>
-                <a:ea typeface="+mn-ea"/>
-                <a:cs typeface="+mn-cs"/>
-              </a:rPr>
-              <a:t>widgetów</a:t>
-            </a:r>
-            <a:r>
-              <a:rPr lang="pl-PL" sz="1200" b="0" i="0" kern="1200" dirty="0" smtClean="0">
-                <a:solidFill>
-                  <a:schemeClr val="tx1"/>
-                </a:solidFill>
-                <a:effectLst/>
-                <a:latin typeface="+mn-lt"/>
-                <a:ea typeface="+mn-ea"/>
-                <a:cs typeface="+mn-cs"/>
-              </a:rPr>
-              <a:t> występujących na wielu stronach. </a:t>
-            </a:r>
-          </a:p>
-          <a:p>
-            <a:pPr marL="228600" lvl="0" indent="-228600">
-              <a:buAutoNum type="arabicParenR"/>
+              <a:rPr lang="pl-PL" baseline="0" dirty="0" smtClean="0">
+                <a:sym typeface="Wingdings" pitchFamily="2" charset="2"/>
+              </a:rPr>
+              <a:t>Nie wspieraj </a:t>
+            </a:r>
+            <a:r>
+              <a:rPr lang="pl-PL" baseline="0" dirty="0" err="1" smtClean="0">
+                <a:sym typeface="Wingdings" pitchFamily="2" charset="2"/>
+              </a:rPr>
+              <a:t>waitów</a:t>
+            </a:r>
+            <a:endParaRPr lang="pl-PL" baseline="0" dirty="0" smtClean="0">
+              <a:sym typeface="Wingdings" pitchFamily="2" charset="2"/>
+            </a:endParaRPr>
+          </a:p>
+          <a:p>
+            <a:pPr marL="457200" lvl="1" indent="0">
+              <a:buNone/>
             </a:pPr>
             <a:r>
-              <a:rPr lang="pl-PL" sz="1200" b="0" i="0" kern="1200" dirty="0" smtClean="0">
-                <a:solidFill>
-                  <a:schemeClr val="tx1"/>
-                </a:solidFill>
-                <a:effectLst/>
-                <a:latin typeface="+mn-lt"/>
-                <a:ea typeface="+mn-ea"/>
-                <a:cs typeface="+mn-cs"/>
-              </a:rPr>
-              <a:t>Przekazywanie kontekstu pomiędzy PO - poza sterownikiem może być przydatne zapamiętanie wcześniejszych wyborów od których może zależeć dalsza interakcja w ramach kolejnych PO</a:t>
-            </a:r>
-          </a:p>
-          <a:p>
-            <a:pPr rtl="0" fontAlgn="ctr"/>
-            <a:endParaRPr lang="pl-PL" sz="1200" b="0" i="0" kern="1200" dirty="0" smtClean="0">
-              <a:solidFill>
-                <a:schemeClr val="tx1"/>
-              </a:solidFill>
-              <a:effectLst/>
-              <a:latin typeface="+mn-lt"/>
-              <a:ea typeface="+mn-ea"/>
-              <a:cs typeface="+mn-cs"/>
-            </a:endParaRPr>
+              <a:rPr lang="pl-PL" baseline="0" dirty="0" smtClean="0">
+                <a:sym typeface="Wingdings" pitchFamily="2" charset="2"/>
+              </a:rPr>
+              <a:t>4) Alternatywą napisanie własnej realizacji</a:t>
+            </a:r>
+          </a:p>
+          <a:p>
+            <a:pPr marL="0" lvl="0" indent="0">
+              <a:buNone/>
+            </a:pPr>
+            <a:endParaRPr lang="pl-PL" baseline="0" dirty="0" smtClean="0"/>
+          </a:p>
+          <a:p>
+            <a:pPr marL="0" marR="0" lvl="0" indent="0" algn="l" defTabSz="914400" rtl="0" eaLnBrk="1" fontAlgn="auto" latinLnBrk="0" hangingPunct="1">
+              <a:lnSpc>
+                <a:spcPct val="100000"/>
+              </a:lnSpc>
+              <a:spcBef>
+                <a:spcPts val="0"/>
+              </a:spcBef>
+              <a:spcAft>
+                <a:spcPts val="0"/>
+              </a:spcAft>
+              <a:buClrTx/>
+              <a:buSzTx/>
+              <a:buFontTx/>
+              <a:buNone/>
+              <a:tabLst/>
+              <a:defRPr/>
+            </a:pPr>
+            <a:r>
+              <a:rPr lang="pl-PL" sz="1200" b="1" i="0" kern="1200" dirty="0" smtClean="0">
+                <a:solidFill>
+                  <a:schemeClr val="tx1"/>
+                </a:solidFill>
+                <a:effectLst/>
+                <a:latin typeface="+mn-lt"/>
+                <a:ea typeface="+mn-ea"/>
+                <a:cs typeface="+mn-cs"/>
+              </a:rPr>
+              <a:t>Odnośniki</a:t>
+            </a:r>
+          </a:p>
+          <a:p>
+            <a:pPr marL="0" lvl="0" indent="0">
+              <a:buNone/>
+            </a:pPr>
+            <a:r>
+              <a:rPr lang="pl-PL" sz="1200" kern="1200" dirty="0" smtClean="0">
+                <a:solidFill>
+                  <a:schemeClr val="tx1"/>
+                </a:solidFill>
+                <a:effectLst/>
+                <a:latin typeface="+mn-lt"/>
+                <a:ea typeface="+mn-ea"/>
+                <a:cs typeface="+mn-cs"/>
+                <a:hlinkClick r:id="rId3"/>
+              </a:rPr>
+              <a:t>http://shanmugavelc.blogspot.com/2011/10/pageobjects-and-pagefactory-selenium-20.html</a:t>
+            </a:r>
+            <a:endParaRPr lang="pl-PL" baseline="0" dirty="0" smtClean="0"/>
           </a:p>
         </p:txBody>
       </p:sp>
@@ -3839,7 +3742,7 @@
     </p:spTree>
     <p:extLst>
       <p:ext uri="{BB962C8B-B14F-4D97-AF65-F5344CB8AC3E}">
-        <p14:creationId xmlns:p14="http://schemas.microsoft.com/office/powerpoint/2010/main" val="486377979"/>
+        <p14:creationId xmlns:p14="http://schemas.microsoft.com/office/powerpoint/2010/main" val="4121352361"/>
       </p:ext>
     </p:extLst>
   </p:cSld>
@@ -4205,188 +4108,6 @@
               </a:rPr>
               <a:t> (z dedykowanymi w aktualnej wersji nie działa zbyt dobrze)</a:t>
             </a:r>
-          </a:p>
-          <a:p>
-            <a:pPr marL="228600" lvl="0" indent="-228600" rtl="0" fontAlgn="ctr">
-              <a:buAutoNum type="arabicParenR"/>
-            </a:pPr>
-            <a:r>
-              <a:rPr lang="pl-PL" sz="1200" b="0" i="0" kern="1200" dirty="0" err="1" smtClean="0">
-                <a:solidFill>
-                  <a:schemeClr val="tx1"/>
-                </a:solidFill>
-                <a:effectLst/>
-                <a:latin typeface="+mn-lt"/>
-                <a:ea typeface="+mn-ea"/>
-                <a:cs typeface="+mn-cs"/>
-              </a:rPr>
-              <a:t>Implict</a:t>
-            </a:r>
-            <a:r>
-              <a:rPr lang="pl-PL" sz="1200" b="0" i="0" kern="1200" dirty="0" smtClean="0">
-                <a:solidFill>
-                  <a:schemeClr val="tx1"/>
-                </a:solidFill>
-                <a:effectLst/>
-                <a:latin typeface="+mn-lt"/>
-                <a:ea typeface="+mn-ea"/>
-                <a:cs typeface="+mn-cs"/>
-              </a:rPr>
-              <a:t> </a:t>
-            </a:r>
-            <a:r>
-              <a:rPr lang="pl-PL" sz="1200" b="0" i="0" kern="1200" dirty="0" err="1" smtClean="0">
-                <a:solidFill>
-                  <a:schemeClr val="tx1"/>
-                </a:solidFill>
-                <a:effectLst/>
-                <a:latin typeface="+mn-lt"/>
-                <a:ea typeface="+mn-ea"/>
-                <a:cs typeface="+mn-cs"/>
-              </a:rPr>
-              <a:t>Waits</a:t>
-            </a:r>
-            <a:r>
-              <a:rPr lang="pl-PL" sz="1200" b="0" i="0" kern="1200" dirty="0" smtClean="0">
-                <a:solidFill>
-                  <a:schemeClr val="tx1"/>
-                </a:solidFill>
-                <a:effectLst/>
-                <a:latin typeface="+mn-lt"/>
-                <a:ea typeface="+mn-ea"/>
-                <a:cs typeface="+mn-cs"/>
-              </a:rPr>
-              <a:t> – spowalniają</a:t>
-            </a:r>
-            <a:r>
-              <a:rPr lang="pl-PL" sz="1200" b="0" i="0" kern="1200" baseline="0" dirty="0" smtClean="0">
-                <a:solidFill>
-                  <a:schemeClr val="tx1"/>
-                </a:solidFill>
-                <a:effectLst/>
-                <a:latin typeface="+mn-lt"/>
-                <a:ea typeface="+mn-ea"/>
-                <a:cs typeface="+mn-cs"/>
-              </a:rPr>
-              <a:t> zakończenie testu w przypadku niepowodzenia –</a:t>
-            </a:r>
-            <a:r>
-              <a:rPr lang="pl-PL" sz="1200" b="0" i="0" kern="1200" baseline="0" dirty="0" err="1" smtClean="0">
-                <a:solidFill>
-                  <a:schemeClr val="tx1"/>
-                </a:solidFill>
-                <a:effectLst/>
-                <a:latin typeface="+mn-lt"/>
-                <a:ea typeface="+mn-ea"/>
-                <a:cs typeface="+mn-cs"/>
-              </a:rPr>
-              <a:t>explicit</a:t>
-            </a:r>
-            <a:r>
-              <a:rPr lang="pl-PL" sz="1200" b="0" i="0" kern="1200" baseline="0" dirty="0" smtClean="0">
-                <a:solidFill>
-                  <a:schemeClr val="tx1"/>
-                </a:solidFill>
-                <a:effectLst/>
-                <a:latin typeface="+mn-lt"/>
-                <a:ea typeface="+mn-ea"/>
-                <a:cs typeface="+mn-cs"/>
-              </a:rPr>
-              <a:t> </a:t>
-            </a:r>
-            <a:r>
-              <a:rPr lang="pl-PL" sz="1200" b="0" i="0" kern="1200" baseline="0" dirty="0" err="1" smtClean="0">
-                <a:solidFill>
-                  <a:schemeClr val="tx1"/>
-                </a:solidFill>
-                <a:effectLst/>
-                <a:latin typeface="+mn-lt"/>
-                <a:ea typeface="+mn-ea"/>
-                <a:cs typeface="+mn-cs"/>
-              </a:rPr>
-              <a:t>wait</a:t>
-            </a:r>
-            <a:r>
-              <a:rPr lang="pl-PL" sz="1200" b="0" i="0" kern="1200" baseline="0" dirty="0" smtClean="0">
-                <a:solidFill>
-                  <a:schemeClr val="tx1"/>
-                </a:solidFill>
-                <a:effectLst/>
-                <a:latin typeface="+mn-lt"/>
-                <a:ea typeface="+mn-ea"/>
-                <a:cs typeface="+mn-cs"/>
-              </a:rPr>
-              <a:t> z </a:t>
-            </a:r>
-            <a:r>
-              <a:rPr lang="pl-PL" sz="1200" b="0" i="0" kern="1200" baseline="0" dirty="0" err="1" smtClean="0">
-                <a:solidFill>
-                  <a:schemeClr val="tx1"/>
-                </a:solidFill>
-                <a:effectLst/>
-                <a:latin typeface="+mn-lt"/>
-                <a:ea typeface="+mn-ea"/>
-                <a:cs typeface="+mn-cs"/>
-              </a:rPr>
-              <a:t>użyciuem</a:t>
-            </a:r>
-            <a:r>
-              <a:rPr lang="pl-PL" sz="1200" b="0" i="0" kern="1200" baseline="0" dirty="0" smtClean="0">
-                <a:solidFill>
-                  <a:schemeClr val="tx1"/>
-                </a:solidFill>
-                <a:effectLst/>
-                <a:latin typeface="+mn-lt"/>
-                <a:ea typeface="+mn-ea"/>
-                <a:cs typeface="+mn-cs"/>
-              </a:rPr>
-              <a:t> </a:t>
-            </a:r>
-            <a:r>
-              <a:rPr lang="pl-PL" sz="1200" b="0" i="0" u="none" kern="1200" baseline="0" dirty="0" err="1" smtClean="0">
-                <a:solidFill>
-                  <a:schemeClr val="tx1"/>
-                </a:solidFill>
-                <a:effectLst/>
-                <a:latin typeface="+mn-lt"/>
-                <a:ea typeface="+mn-ea"/>
-                <a:cs typeface="+mn-cs"/>
-              </a:rPr>
-              <a:t>WebDriverWait#Until</a:t>
-            </a:r>
-            <a:r>
-              <a:rPr lang="pl-PL" sz="1200" b="0" i="0" u="none" kern="1200" baseline="0" dirty="0" smtClean="0">
-                <a:solidFill>
-                  <a:schemeClr val="tx1"/>
-                </a:solidFill>
-                <a:effectLst/>
-                <a:latin typeface="+mn-lt"/>
-                <a:ea typeface="+mn-ea"/>
-                <a:cs typeface="+mn-cs"/>
-              </a:rPr>
-              <a:t> – </a:t>
-            </a:r>
-            <a:r>
-              <a:rPr lang="pl-PL" sz="1200" b="0" i="0" u="none" kern="1200" baseline="0" dirty="0" err="1" smtClean="0">
-                <a:solidFill>
-                  <a:schemeClr val="tx1"/>
-                </a:solidFill>
-                <a:effectLst/>
-                <a:latin typeface="+mn-lt"/>
-                <a:ea typeface="+mn-ea"/>
-                <a:cs typeface="+mn-cs"/>
-              </a:rPr>
-              <a:t>polling</a:t>
-            </a:r>
-            <a:endParaRPr lang="pl-PL" sz="1200" b="0" i="0" u="none" kern="1200" baseline="0" dirty="0" smtClean="0">
-              <a:solidFill>
-                <a:schemeClr val="tx1"/>
-              </a:solidFill>
-              <a:effectLst/>
-              <a:latin typeface="+mn-lt"/>
-              <a:ea typeface="+mn-ea"/>
-              <a:cs typeface="+mn-cs"/>
-            </a:endParaRPr>
           </a:p>
           <a:p>
             <a:pPr marL="228600" lvl="0" indent="-228600" rtl="0" fontAlgn="ctr">
@@ -6648,7 +6369,144 @@
           <a:bodyPr/>
           <a:lstStyle/>
           <a:p>
-            <a:pPr rtl="0" fontAlgn="ctr"/>
+            <a:r>
+              <a:rPr lang="en-US" sz="1200" kern="1200" dirty="0" smtClean="0">
+                <a:solidFill>
+                  <a:schemeClr val="tx1"/>
+                </a:solidFill>
+                <a:effectLst/>
+                <a:latin typeface="+mn-lt"/>
+                <a:ea typeface="+mn-ea"/>
+                <a:cs typeface="+mn-cs"/>
+                <a:hlinkClick r:id="rId3"/>
+              </a:rPr>
+              <a:t>https://github.com/merdacz/AspNetTesting/blob/e9dd24ddd0a335f9da5dccc53ea2f24b523517ac/Source/Net.Daczkowski.AspNetTesting.FunctionalTests/CartTests.cs#L22</a:t>
+            </a:r>
+            <a:endParaRPr lang="en-US" sz="1200" kern="1200" dirty="0" smtClean="0">
+              <a:solidFill>
+                <a:schemeClr val="tx1"/>
+              </a:solidFill>
+              <a:effectLst/>
+              <a:latin typeface="+mn-lt"/>
+              <a:ea typeface="+mn-ea"/>
+              <a:cs typeface="+mn-cs"/>
+            </a:endParaRPr>
+          </a:p>
+          <a:p>
+            <a:pPr marL="0" marR="0" lvl="0" indent="0" algn="l" defTabSz="914400" rtl="0" eaLnBrk="1" fontAlgn="auto" latinLnBrk="0" hangingPunct="1">
+              <a:lnSpc>
+                <a:spcPct val="100000"/>
+              </a:lnSpc>
+              <a:spcBef>
+                <a:spcPts val="0"/>
+              </a:spcBef>
+              <a:spcAft>
+                <a:spcPts val="0"/>
+              </a:spcAft>
+              <a:buClrTx/>
+              <a:buSzTx/>
+              <a:buFontTx/>
+              <a:buNone/>
+              <a:tabLst/>
+              <a:defRPr/>
+            </a:pPr>
+            <a:endParaRPr lang="en-US" sz="1200" b="1" i="0" kern="1200" dirty="0" smtClean="0">
+              <a:solidFill>
+                <a:schemeClr val="tx1"/>
+              </a:solidFill>
+              <a:effectLst/>
+              <a:latin typeface="+mn-lt"/>
+              <a:ea typeface="+mn-ea"/>
+              <a:cs typeface="+mn-cs"/>
+            </a:endParaRPr>
+          </a:p>
+          <a:p>
+            <a:pPr marL="0" marR="0" lvl="0" indent="0" algn="l" defTabSz="914400" rtl="0" eaLnBrk="1" fontAlgn="auto" latinLnBrk="0" hangingPunct="1">
+              <a:lnSpc>
+                <a:spcPct val="100000"/>
+              </a:lnSpc>
+              <a:spcBef>
+                <a:spcPts val="0"/>
+              </a:spcBef>
+              <a:spcAft>
+                <a:spcPts val="0"/>
+              </a:spcAft>
+              <a:buClrTx/>
+              <a:buSzTx/>
+              <a:buFontTx/>
+              <a:buNone/>
+              <a:tabLst/>
+              <a:defRPr/>
+            </a:pPr>
+            <a:r>
+              <a:rPr lang="en-US" sz="1200" kern="1200" dirty="0" smtClean="0">
+                <a:solidFill>
+                  <a:schemeClr val="tx1"/>
+                </a:solidFill>
+                <a:effectLst/>
+                <a:latin typeface="+mn-lt"/>
+                <a:ea typeface="+mn-ea"/>
+                <a:cs typeface="+mn-cs"/>
+                <a:hlinkClick r:id="rId4"/>
+              </a:rPr>
+              <a:t>https://github.com/merdacz/AspNetTesting/blob/master/Source/Net.Daczkowski.AspNetTesting.FunctionalTests/CartTests.cs#L17</a:t>
+            </a:r>
+            <a:endParaRPr lang="en-US" sz="1200" kern="1200" dirty="0" smtClean="0">
+              <a:solidFill>
+                <a:schemeClr val="tx1"/>
+              </a:solidFill>
+              <a:effectLst/>
+              <a:latin typeface="+mn-lt"/>
+              <a:ea typeface="+mn-ea"/>
+              <a:cs typeface="+mn-cs"/>
+            </a:endParaRPr>
+          </a:p>
+          <a:p>
+            <a:pPr marL="0" marR="0" lvl="0" indent="0" algn="l" defTabSz="914400" rtl="0" eaLnBrk="1" fontAlgn="auto" latinLnBrk="0" hangingPunct="1">
+              <a:lnSpc>
+                <a:spcPct val="100000"/>
+              </a:lnSpc>
+              <a:spcBef>
+                <a:spcPts val="0"/>
+              </a:spcBef>
+              <a:spcAft>
+                <a:spcPts val="0"/>
+              </a:spcAft>
+              <a:buClrTx/>
+              <a:buSzTx/>
+              <a:buFontTx/>
+              <a:buNone/>
+              <a:tabLst/>
+              <a:defRPr/>
+            </a:pPr>
+            <a:endParaRPr lang="en-US" sz="1200" b="1" i="0" kern="1200" dirty="0" smtClean="0">
+              <a:solidFill>
+                <a:schemeClr val="tx1"/>
+              </a:solidFill>
+              <a:effectLst/>
+              <a:latin typeface="+mn-lt"/>
+              <a:ea typeface="+mn-ea"/>
+              <a:cs typeface="+mn-cs"/>
+            </a:endParaRPr>
+          </a:p>
+          <a:p>
+            <a:pPr marL="0" marR="0" lvl="0" indent="0" algn="l" defTabSz="914400" rtl="0" eaLnBrk="1" fontAlgn="auto" latinLnBrk="0" hangingPunct="1">
+              <a:lnSpc>
+                <a:spcPct val="100000"/>
+              </a:lnSpc>
+              <a:spcBef>
+                <a:spcPts val="0"/>
+              </a:spcBef>
+              <a:spcAft>
+                <a:spcPts val="0"/>
+              </a:spcAft>
+              <a:buClrTx/>
+              <a:buSzTx/>
+              <a:buFontTx/>
+              <a:buNone/>
+              <a:tabLst/>
+              <a:defRPr/>
+            </a:pPr>
             <a:r>
               <a:rPr lang="pl-PL" sz="1200" b="1" i="0" kern="1200" dirty="0" smtClean="0">
                 <a:solidFill>
@@ -6659,76 +6517,158 @@
                 <a:ea typeface="+mn-ea"/>
                 <a:cs typeface="+mn-cs"/>
               </a:rPr>
-              <a:t>Korzyści płynące z testów end-to-end.</a:t>
-            </a:r>
-          </a:p>
-          <a:p>
-            <a:pPr marL="228600" indent="-228600" rtl="0" fontAlgn="ctr">
-              <a:buAutoNum type="arabicParenR"/>
+              <a:t>Odnośniki</a:t>
+            </a:r>
+            <a:endParaRPr lang="en-US" sz="1200" b="1" i="0" kern="1200" dirty="0" smtClean="0">
+              <a:solidFill>
+                <a:schemeClr val="tx1"/>
+              </a:solidFill>
+              <a:effectLst/>
+              <a:latin typeface="+mn-lt"/>
+              <a:ea typeface="+mn-ea"/>
+              <a:cs typeface="+mn-cs"/>
+            </a:endParaRPr>
+          </a:p>
+          <a:p>
+            <a:pPr marL="0" marR="0" lvl="0" indent="0" algn="l" defTabSz="914400" rtl="0" eaLnBrk="1" fontAlgn="auto" latinLnBrk="0" hangingPunct="1">
+              <a:lnSpc>
+                <a:spcPct val="100000"/>
+              </a:lnSpc>
+              <a:spcBef>
+                <a:spcPts val="0"/>
+              </a:spcBef>
+              <a:spcAft>
+                <a:spcPts val="0"/>
+              </a:spcAft>
+              <a:buClrTx/>
+              <a:buSzTx/>
+              <a:buFontTx/>
+              <a:buNone/>
+              <a:tabLst/>
+              <a:defRPr/>
             </a:pPr>
-            <a:r>
-              <a:rPr lang="pl-PL" sz="1200" b="0" i="0" kern="1200" dirty="0" smtClean="0">
-                <a:solidFill>
-                  <a:schemeClr val="tx1"/>
-                </a:solidFill>
-                <a:effectLst/>
-                <a:latin typeface="+mn-lt"/>
-                <a:ea typeface="+mn-ea"/>
-                <a:cs typeface="+mn-cs"/>
-              </a:rPr>
-              <a:t>Minimalizacja czasu potrzebnego na testy regresywne</a:t>
-            </a:r>
-          </a:p>
-          <a:p>
-            <a:pPr marL="228600" indent="-228600" rtl="0" fontAlgn="ctr">
-              <a:buAutoNum type="arabicParenR"/>
+            <a:endParaRPr lang="en-US" sz="1200" b="1" i="0" kern="1200" dirty="0" smtClean="0">
+              <a:solidFill>
+                <a:schemeClr val="tx1"/>
+              </a:solidFill>
+              <a:effectLst/>
+              <a:latin typeface="+mn-lt"/>
+              <a:ea typeface="+mn-ea"/>
+              <a:cs typeface="+mn-cs"/>
+            </a:endParaRPr>
+          </a:p>
+          <a:p>
+            <a:pPr marL="0" marR="0" lvl="0" indent="0" algn="l" defTabSz="914400" rtl="0" eaLnBrk="1" fontAlgn="auto" latinLnBrk="0" hangingPunct="1">
+              <a:lnSpc>
+                <a:spcPct val="100000"/>
+              </a:lnSpc>
+              <a:spcBef>
+                <a:spcPts val="0"/>
+              </a:spcBef>
+              <a:spcAft>
+                <a:spcPts val="0"/>
+              </a:spcAft>
+              <a:buClrTx/>
+              <a:buSzTx/>
+              <a:buFontTx/>
+              <a:buNone/>
+              <a:tabLst/>
+              <a:defRPr/>
             </a:pPr>
-            <a:r>
-              <a:rPr lang="pl-PL" sz="1200" b="0" i="0" kern="1200" dirty="0" smtClean="0">
-                <a:solidFill>
-                  <a:schemeClr val="tx1"/>
-                </a:solidFill>
-                <a:effectLst/>
-                <a:latin typeface="+mn-lt"/>
-                <a:ea typeface="+mn-ea"/>
-                <a:cs typeface="+mn-cs"/>
-              </a:rPr>
-              <a:t>Wykorzystanie podczas prac programistycznych </a:t>
-            </a:r>
-          </a:p>
-          <a:p>
-            <a:pPr marL="228600" indent="-228600" rtl="0" fontAlgn="ctr">
-              <a:buAutoNum type="arabicParenR"/>
-            </a:pPr>
-            <a:r>
-              <a:rPr lang="pl-PL" sz="1200" b="0" i="0" kern="1200" dirty="0" smtClean="0">
-                <a:solidFill>
-                  <a:schemeClr val="tx1"/>
-                </a:solidFill>
-                <a:effectLst/>
-                <a:latin typeface="+mn-lt"/>
-                <a:ea typeface="+mn-ea"/>
-                <a:cs typeface="+mn-cs"/>
-              </a:rPr>
-              <a:t>Zwiększenie pokrycia testów przeglądarek i różnych rozdzielczości także celem dostosowania do urządzeń mobilnych</a:t>
-            </a:r>
-          </a:p>
-          <a:p>
-            <a:pPr marL="228600" indent="-228600" rtl="0" fontAlgn="ctr">
-              <a:buAutoNum type="arabicParenR"/>
-            </a:pPr>
-            <a:r>
-              <a:rPr lang="pl-PL" sz="1200" b="0" i="0" kern="1200" dirty="0" smtClean="0">
-                <a:solidFill>
-                  <a:schemeClr val="tx1"/>
-                </a:solidFill>
-                <a:effectLst/>
-                <a:latin typeface="+mn-lt"/>
-                <a:ea typeface="+mn-ea"/>
-                <a:cs typeface="+mn-cs"/>
-              </a:rPr>
-              <a:t>Możliwość masowego przetestowania aplikacji poprzez sparametryzowane testy </a:t>
-            </a:r>
+            <a:endParaRPr lang="pl-PL" sz="1200" b="1" i="0" kern="1200" dirty="0" smtClean="0">
+              <a:solidFill>
+                <a:schemeClr val="tx1"/>
+              </a:solidFill>
+              <a:effectLst/>
+              <a:latin typeface="+mn-lt"/>
+              <a:ea typeface="+mn-ea"/>
+              <a:cs typeface="+mn-cs"/>
+            </a:endParaRPr>
+          </a:p>
+          <a:p>
+            <a:r>
+              <a:rPr lang="pl-PL" sz="1200" kern="1200" dirty="0" smtClean="0">
+                <a:solidFill>
+                  <a:schemeClr val="tx1"/>
+                </a:solidFill>
+                <a:effectLst/>
+                <a:latin typeface="+mn-lt"/>
+                <a:ea typeface="+mn-ea"/>
+                <a:cs typeface="+mn-cs"/>
+                <a:hlinkClick r:id="rId5"/>
+              </a:rPr>
+              <a:t>http://rationaleemotions.wordpress.com/2012/05/25/working-with-safari-driver/</a:t>
+            </a:r>
+            <a:endParaRPr lang="pl-PL" sz="1200" kern="1200" dirty="0" smtClean="0">
+              <a:solidFill>
+                <a:schemeClr val="tx1"/>
+              </a:solidFill>
+              <a:effectLst/>
+              <a:latin typeface="+mn-lt"/>
+              <a:ea typeface="+mn-ea"/>
+              <a:cs typeface="+mn-cs"/>
+            </a:endParaRPr>
+          </a:p>
+          <a:p>
+            <a:r>
+              <a:rPr lang="pl-PL" sz="1200" kern="1200" dirty="0" smtClean="0">
+                <a:solidFill>
+                  <a:schemeClr val="tx1"/>
+                </a:solidFill>
+                <a:effectLst/>
+                <a:latin typeface="+mn-lt"/>
+                <a:ea typeface="+mn-ea"/>
+                <a:cs typeface="+mn-cs"/>
+                <a:hlinkClick r:id="rId6"/>
+              </a:rPr>
+              <a:t>https://docs.google.com/folder/d/0B5KGduKl6s6-c3dlMWVNcTJhLUk/edit?docId=0B5KGduKl6s6-YjZILWd1WEJMRUU</a:t>
+            </a:r>
+            <a:endParaRPr lang="pl-PL" sz="1200" kern="1200" dirty="0" smtClean="0">
+              <a:solidFill>
+                <a:schemeClr val="tx1"/>
+              </a:solidFill>
+              <a:effectLst/>
+              <a:latin typeface="+mn-lt"/>
+              <a:ea typeface="+mn-ea"/>
+              <a:cs typeface="+mn-cs"/>
+            </a:endParaRPr>
+          </a:p>
+          <a:p>
+            <a:r>
+              <a:rPr lang="pl-PL" sz="1200" kern="1200" dirty="0" smtClean="0">
+                <a:solidFill>
+                  <a:schemeClr val="tx1"/>
+                </a:solidFill>
+                <a:effectLst/>
+                <a:latin typeface="+mn-lt"/>
+                <a:ea typeface="+mn-ea"/>
+                <a:cs typeface="+mn-cs"/>
+                <a:hlinkClick r:id="rId7"/>
+              </a:rPr>
+              <a:t>http://</a:t>
+            </a:r>
+            <a:r>
+              <a:rPr lang="pl-PL" sz="1200" kern="1200" dirty="0" smtClean="0">
+                <a:solidFill>
+                  <a:schemeClr val="tx1"/>
+                </a:solidFill>
+                <a:effectLst/>
+                <a:latin typeface="+mn-lt"/>
+                <a:ea typeface="+mn-ea"/>
+                <a:cs typeface="+mn-cs"/>
+                <a:hlinkClick r:id="rId7"/>
+              </a:rPr>
+              <a:t>code.google.com/p/selenium/issues/detail?id=4107</a:t>
+            </a:r>
+            <a:endParaRPr lang="en-US" sz="1200" kern="1200" dirty="0" smtClean="0">
+              <a:solidFill>
+                <a:schemeClr val="tx1"/>
+              </a:solidFill>
+              <a:effectLst/>
+              <a:latin typeface="+mn-lt"/>
+              <a:ea typeface="+mn-ea"/>
+              <a:cs typeface="+mn-cs"/>
+            </a:endParaRPr>
           </a:p>
           <a:p>
             <a:endParaRPr lang="en-US" dirty="0"/>
@@ -6761,7 +6701,7 @@
     </p:spTree>
     <p:extLst>
       <p:ext uri="{BB962C8B-B14F-4D97-AF65-F5344CB8AC3E}">
-        <p14:creationId xmlns:p14="http://schemas.microsoft.com/office/powerpoint/2010/main" val="3905152230"/>
+        <p14:creationId xmlns:p14="http://schemas.microsoft.com/office/powerpoint/2010/main" val="2739613348"/>
       </p:ext>
     </p:extLst>
   </p:cSld>
@@ -6826,7 +6766,7 @@
                 <a:ea typeface="+mn-ea"/>
                 <a:cs typeface="+mn-cs"/>
               </a:rPr>
-              <a:t>Jakie scenariusze testować jako end-to-end i kto powinien je tworzyć aby ograniczyć koszty</a:t>
+              <a:t>Korzyści płynące z testów end-to-end.</a:t>
             </a:r>
           </a:p>
           <a:p>
@@ -6843,43 +6783,7 @@
                 <a:ea typeface="+mn-ea"/>
                 <a:cs typeface="+mn-cs"/>
               </a:rPr>
-              <a:t>Buduj testy stopniowo poczynając od kluczowych </a:t>
-            </a:r>
-            <a:r>
-              <a:rPr lang="pl-PL" sz="1200" b="1" i="0" u="sng" kern="1200" dirty="0" smtClean="0">
-                <a:solidFill>
-                  <a:schemeClr val="tx1"/>
-                </a:solidFill>
-                <a:effectLst/>
-                <a:latin typeface="+mn-lt"/>
-                <a:ea typeface="+mn-ea"/>
-                <a:cs typeface="+mn-cs"/>
-              </a:rPr>
-              <a:t>biznesowo</a:t>
-            </a:r>
-            <a:r>
-              <a:rPr lang="pl-PL" sz="1200" b="1" i="0" kern="1200" dirty="0" smtClean="0">
-                <a:solidFill>
-                  <a:schemeClr val="tx1"/>
-                </a:solidFill>
-                <a:effectLst/>
-                <a:latin typeface="+mn-lt"/>
-                <a:ea typeface="+mn-ea"/>
-                <a:cs typeface="+mn-cs"/>
-              </a:rPr>
-              <a:t> </a:t>
-            </a:r>
-            <a:r>
-              <a:rPr lang="pl-PL" sz="1200" b="0" i="0" kern="1200" dirty="0" smtClean="0">
-                <a:solidFill>
-                  <a:schemeClr val="tx1"/>
-                </a:solidFill>
-                <a:effectLst/>
-                <a:latin typeface="+mn-lt"/>
-                <a:ea typeface="+mn-ea"/>
-                <a:cs typeface="+mn-cs"/>
-              </a:rPr>
-              <a:t>scenariuszy - np. dla sklepu internetowego możliwość złożenia zamówienia, gdyż brak takiej możliwości  generuje straty</a:t>
+              <a:t>Minimalizacja czasu potrzebnego na testy regresywne</a:t>
             </a:r>
           </a:p>
           <a:p>
@@ -6896,7 +6800,7 @@
                 <a:ea typeface="+mn-ea"/>
                 <a:cs typeface="+mn-cs"/>
               </a:rPr>
-              <a:t>Testy "pozytywnych ścieżek" - test ma pokazać, że system działa poprawnie  w ramach testów regresywnych a nie znajdować błędy (to łatwiej robić manualnie) ew. jeśli  manualnie znaleziony błąd zostanie zidentyfikowany jako kluczowe zagrożenie biznesowe można zastanowić się czy nie warto napisać na niego test. </a:t>
+              <a:t>Wykorzystanie podczas prac programistycznych </a:t>
             </a:r>
           </a:p>
           <a:p>
@@ -6913,63 +6817,8 @@
                 <a:ea typeface="+mn-ea"/>
                 <a:cs typeface="+mn-cs"/>
               </a:rPr>
-              <a:t>Minimalizowanie ilości sprawdzeń</a:t>
-            </a:r>
-          </a:p>
-          <a:p>
-            <a:pPr marL="685800" lvl="1" indent="-228600" rtl="0" fontAlgn="ctr">
-              <a:buAutoNum type="arabicParenR"/>
-            </a:pPr>
-            <a:r>
-              <a:rPr lang="pl-PL" sz="1200" b="0" i="0" kern="1200" dirty="0" smtClean="0">
-                <a:solidFill>
-                  <a:schemeClr val="tx1"/>
-                </a:solidFill>
-                <a:effectLst/>
-                <a:latin typeface="+mn-lt"/>
-                <a:ea typeface="+mn-ea"/>
-                <a:cs typeface="+mn-cs"/>
-              </a:rPr>
-              <a:t>dla wyszukiwarki internetowej będzie to wyszukanie frazy i uzyskanie jakichś wyników niekoniecznie sprawdzenie czy wyniki są poprawne - od tego są testy niższego poziomu (jednostkowe, integracyjne) testujące znacznie szerzej algorytm wyszukiwania. </a:t>
-            </a:r>
-          </a:p>
-          <a:p>
-            <a:pPr marL="685800" lvl="1" indent="-228600" rtl="0" fontAlgn="ctr">
-              <a:buAutoNum type="arabicParenR"/>
-            </a:pPr>
-            <a:r>
-              <a:rPr lang="pl-PL" sz="1200" b="0" i="0" kern="1200" dirty="0" smtClean="0">
-                <a:solidFill>
-                  <a:schemeClr val="tx1"/>
-                </a:solidFill>
-                <a:effectLst/>
-                <a:latin typeface="+mn-lt"/>
-                <a:ea typeface="+mn-ea"/>
-                <a:cs typeface="+mn-cs"/>
-              </a:rPr>
-              <a:t>Sprawdzaj tylko</a:t>
-            </a:r>
-            <a:r>
-              <a:rPr lang="pl-PL" sz="1200" b="0" i="0" kern="1200" baseline="0" dirty="0" smtClean="0">
-                <a:solidFill>
-                  <a:schemeClr val="tx1"/>
-                </a:solidFill>
-                <a:effectLst/>
-                <a:latin typeface="+mn-lt"/>
-                <a:ea typeface="+mn-ea"/>
-                <a:cs typeface="+mn-cs"/>
-              </a:rPr>
-              <a:t> wystąpienie elementów (np. po klasie) a nie kompletny tekst / zawartość – może łatwo ulec zmianie </a:t>
-            </a:r>
-            <a:endParaRPr lang="pl-PL" sz="1200" b="0" i="0" kern="1200" dirty="0" smtClean="0">
-              <a:solidFill>
-                <a:schemeClr val="tx1"/>
-              </a:solidFill>
-              <a:effectLst/>
-              <a:latin typeface="+mn-lt"/>
-              <a:ea typeface="+mn-ea"/>
-              <a:cs typeface="+mn-cs"/>
-            </a:endParaRPr>
+              <a:t>Zwiększenie pokrycia testów przeglądarek i różnych rozdzielczości także celem dostosowania do urządzeń mobilnych</a:t>
+            </a:r>
           </a:p>
           <a:p>
             <a:pPr marL="228600" indent="-228600" rtl="0" fontAlgn="ctr">
@@ -6985,75 +6834,7 @@
                 <a:ea typeface="+mn-ea"/>
                 <a:cs typeface="+mn-cs"/>
               </a:rPr>
-              <a:t>Podejście oparte o cały zespół</a:t>
-            </a:r>
-          </a:p>
-          <a:p>
-            <a:pPr marL="685800" lvl="1" indent="-228600" rtl="0" fontAlgn="ctr">
-              <a:buAutoNum type="arabicParenR"/>
-            </a:pPr>
-            <a:r>
-              <a:rPr lang="pl-PL" sz="1200" b="0" i="0" kern="1200" dirty="0" smtClean="0">
-                <a:solidFill>
-                  <a:schemeClr val="tx1"/>
-                </a:solidFill>
-                <a:effectLst/>
-                <a:latin typeface="+mn-lt"/>
-                <a:ea typeface="+mn-ea"/>
-                <a:cs typeface="+mn-cs"/>
-              </a:rPr>
-              <a:t>Wspólna odpowiedzialność za testy - szczególnie utrzymanie już istniejącego ich zestawu - stąd warto aby wspólny język z kodem aplikacji</a:t>
-            </a:r>
-          </a:p>
-          <a:p>
-            <a:pPr marL="685800" lvl="1" indent="-228600" rtl="0" fontAlgn="ctr">
-              <a:buAutoNum type="arabicParenR"/>
-            </a:pPr>
-            <a:r>
-              <a:rPr lang="pl-PL" sz="1200" b="0" i="0" kern="1200" dirty="0" smtClean="0">
-                <a:solidFill>
-                  <a:schemeClr val="tx1"/>
-                </a:solidFill>
-                <a:effectLst/>
-                <a:latin typeface="+mn-lt"/>
-                <a:ea typeface="+mn-ea"/>
-                <a:cs typeface="+mn-cs"/>
-              </a:rPr>
-              <a:t>Testy przydatne dla realizujących funkcjonalności - uruchomienie testu zamiast ręcznego przygotowywania środowiska za każdym razem </a:t>
-            </a:r>
-          </a:p>
-          <a:p>
-            <a:pPr marL="685800" lvl="1" indent="-228600" rtl="0" fontAlgn="ctr">
-              <a:buAutoNum type="arabicParenR"/>
-            </a:pPr>
-            <a:r>
-              <a:rPr lang="pl-PL" sz="1200" b="0" i="0" kern="1200" dirty="0" smtClean="0">
-                <a:solidFill>
-                  <a:schemeClr val="tx1"/>
-                </a:solidFill>
-                <a:effectLst/>
-                <a:latin typeface="+mn-lt"/>
-                <a:ea typeface="+mn-ea"/>
-                <a:cs typeface="+mn-cs"/>
-              </a:rPr>
-              <a:t>Testy przydatne jako specyfikacje dla PM </a:t>
-            </a:r>
-          </a:p>
-          <a:p>
-            <a:pPr marL="685800" lvl="1" indent="-228600" rtl="0" fontAlgn="ctr">
-              <a:buAutoNum type="arabicParenR"/>
-            </a:pPr>
-            <a:r>
-              <a:rPr lang="pl-PL" sz="1200" b="0" i="0" kern="1200" dirty="0" smtClean="0">
-                <a:solidFill>
-                  <a:schemeClr val="tx1"/>
-                </a:solidFill>
-                <a:effectLst/>
-                <a:latin typeface="+mn-lt"/>
-                <a:ea typeface="+mn-ea"/>
-                <a:cs typeface="+mn-cs"/>
-              </a:rPr>
-              <a:t>Krótkie iteracje - realizacja kolejnych testów razem z funkcjonalnościami </a:t>
+              <a:t>Możliwość masowego przetestowania aplikacji poprzez sparametryzowane testy </a:t>
             </a:r>
           </a:p>
           <a:p>
@@ -7141,24 +6922,49 @@
           <a:bodyPr/>
           <a:lstStyle/>
           <a:p>
-            <a:pPr marL="0" marR="0" lvl="0" indent="0" algn="l" defTabSz="914400" rtl="0" eaLnBrk="1" fontAlgn="auto" latinLnBrk="0" hangingPunct="1">
-              <a:lnSpc>
-                <a:spcPct val="100000"/>
-              </a:lnSpc>
-              <a:spcBef>
-                <a:spcPts val="0"/>
-              </a:spcBef>
-              <a:spcAft>
-                <a:spcPts val="0"/>
-              </a:spcAft>
-              <a:buClrTx/>
-              <a:buSzTx/>
-              <a:buFontTx/>
-              <a:buNone/>
-              <a:tabLst/>
-              <a:defRPr/>
+            <a:pPr rtl="0" fontAlgn="ctr"/>
+            <a:r>
+              <a:rPr lang="pl-PL" sz="1200" b="1" i="0" kern="1200" dirty="0" smtClean="0">
+                <a:solidFill>
+                  <a:schemeClr val="tx1"/>
+                </a:solidFill>
+                <a:effectLst/>
+                <a:latin typeface="+mn-lt"/>
+                <a:ea typeface="+mn-ea"/>
+                <a:cs typeface="+mn-cs"/>
+              </a:rPr>
+              <a:t>Jakie scenariusze testować jako end-to-end i kto powinien je tworzyć aby ograniczyć koszty</a:t>
+            </a:r>
+          </a:p>
+          <a:p>
+            <a:pPr marL="228600" indent="-228600" rtl="0" fontAlgn="ctr">
+              <a:buAutoNum type="arabicParenR"/>
             </a:pPr>
             <a:r>
+              <a:rPr lang="pl-PL" sz="1200" b="0" i="0" kern="1200" dirty="0" smtClean="0">
+                <a:solidFill>
+                  <a:schemeClr val="tx1"/>
+                </a:solidFill>
+                <a:effectLst/>
+                <a:latin typeface="+mn-lt"/>
+                <a:ea typeface="+mn-ea"/>
+                <a:cs typeface="+mn-cs"/>
+              </a:rPr>
+              <a:t>Buduj testy stopniowo poczynając od kluczowych </a:t>
+            </a:r>
+            <a:r>
+              <a:rPr lang="pl-PL" sz="1200" b="1" i="0" u="sng" kern="1200" dirty="0" smtClean="0">
+                <a:solidFill>
+                  <a:schemeClr val="tx1"/>
+                </a:solidFill>
+                <a:effectLst/>
+                <a:latin typeface="+mn-lt"/>
+                <a:ea typeface="+mn-ea"/>
+                <a:cs typeface="+mn-cs"/>
+              </a:rPr>
+              <a:t>biznesowo</a:t>
+            </a:r>
+            <a:r>
               <a:rPr lang="pl-PL" sz="1200" b="1" i="0" kern="1200" dirty="0" smtClean="0">
                 <a:solidFill>
                   <a:schemeClr val="tx1"/>
@@ -7168,24 +6974,101 @@
                 <a:ea typeface="+mn-ea"/>
                 <a:cs typeface="+mn-cs"/>
               </a:rPr>
-              <a:t>Odnośniki</a:t>
-            </a:r>
-          </a:p>
-          <a:p>
-            <a:r>
-              <a:rPr lang="pl-PL" sz="1200" kern="1200" dirty="0" smtClean="0">
-                <a:solidFill>
-                  <a:schemeClr val="tx1"/>
-                </a:solidFill>
-                <a:effectLst/>
-                <a:latin typeface="+mn-lt"/>
-                <a:ea typeface="+mn-ea"/>
-                <a:cs typeface="+mn-cs"/>
-                <a:hlinkClick r:id="rId3"/>
-              </a:rPr>
-              <a:t>http://rationaleemotions.wordpress.com/2012/05/25/working-with-safari-driver/</a:t>
-            </a:r>
-            <a:endParaRPr lang="pl-PL" sz="1200" kern="1200" dirty="0" smtClean="0">
+              <a:t> </a:t>
+            </a:r>
+            <a:r>
+              <a:rPr lang="pl-PL" sz="1200" b="0" i="0" kern="1200" dirty="0" smtClean="0">
+                <a:solidFill>
+                  <a:schemeClr val="tx1"/>
+                </a:solidFill>
+                <a:effectLst/>
+                <a:latin typeface="+mn-lt"/>
+                <a:ea typeface="+mn-ea"/>
+                <a:cs typeface="+mn-cs"/>
+              </a:rPr>
+              <a:t>scenariuszy - np. dla sklepu internetowego możliwość złożenia zamówienia, gdyż brak takiej możliwości  generuje straty</a:t>
+            </a:r>
+          </a:p>
+          <a:p>
+            <a:pPr marL="228600" indent="-228600" rtl="0" fontAlgn="ctr">
+              <a:buAutoNum type="arabicParenR"/>
+            </a:pPr>
+            <a:r>
+              <a:rPr lang="pl-PL" sz="1200" b="0" i="0" kern="1200" dirty="0" smtClean="0">
+                <a:solidFill>
+                  <a:schemeClr val="tx1"/>
+                </a:solidFill>
+                <a:effectLst/>
+                <a:latin typeface="+mn-lt"/>
+                <a:ea typeface="+mn-ea"/>
+                <a:cs typeface="+mn-cs"/>
+              </a:rPr>
+              <a:t>Testy "pozytywnych ścieżek" - test ma pokazać, że system działa poprawnie  w ramach testów regresywnych a nie znajdować błędy (to łatwiej robić manualnie) ew. jeśli  manualnie znaleziony błąd zostanie zidentyfikowany jako kluczowe zagrożenie biznesowe można zastanowić się czy nie warto napisać na niego test. </a:t>
+            </a:r>
+          </a:p>
+          <a:p>
+            <a:pPr marL="228600" indent="-228600" rtl="0" fontAlgn="ctr">
+              <a:buAutoNum type="arabicParenR"/>
+            </a:pPr>
+            <a:r>
+              <a:rPr lang="pl-PL" sz="1200" b="0" i="0" kern="1200" dirty="0" smtClean="0">
+                <a:solidFill>
+                  <a:schemeClr val="tx1"/>
+                </a:solidFill>
+                <a:effectLst/>
+                <a:latin typeface="+mn-lt"/>
+                <a:ea typeface="+mn-ea"/>
+                <a:cs typeface="+mn-cs"/>
+              </a:rPr>
+              <a:t>Minimalizowanie ilości sprawdzeń</a:t>
+            </a:r>
+          </a:p>
+          <a:p>
+            <a:pPr marL="685800" lvl="1" indent="-228600" rtl="0" fontAlgn="ctr">
+              <a:buAutoNum type="arabicParenR"/>
+            </a:pPr>
+            <a:r>
+              <a:rPr lang="pl-PL" sz="1200" b="0" i="0" kern="1200" dirty="0" smtClean="0">
+                <a:solidFill>
+                  <a:schemeClr val="tx1"/>
+                </a:solidFill>
+                <a:effectLst/>
+                <a:latin typeface="+mn-lt"/>
+                <a:ea typeface="+mn-ea"/>
+                <a:cs typeface="+mn-cs"/>
+              </a:rPr>
+              <a:t>dla wyszukiwarki internetowej będzie to wyszukanie frazy i uzyskanie jakichś wyników niekoniecznie sprawdzenie czy wyniki są poprawne - od tego są testy niższego poziomu (jednostkowe, integracyjne) testujące znacznie szerzej algorytm wyszukiwania. </a:t>
+            </a:r>
+          </a:p>
+          <a:p>
+            <a:pPr marL="685800" lvl="1" indent="-228600" rtl="0" fontAlgn="ctr">
+              <a:buAutoNum type="arabicParenR"/>
+            </a:pPr>
+            <a:r>
+              <a:rPr lang="pl-PL" sz="1200" b="0" i="0" kern="1200" dirty="0" smtClean="0">
+                <a:solidFill>
+                  <a:schemeClr val="tx1"/>
+                </a:solidFill>
+                <a:effectLst/>
+                <a:latin typeface="+mn-lt"/>
+                <a:ea typeface="+mn-ea"/>
+                <a:cs typeface="+mn-cs"/>
+              </a:rPr>
+              <a:t>Sprawdzaj tylko</a:t>
+            </a:r>
+            <a:r>
+              <a:rPr lang="pl-PL" sz="1200" b="0" i="0" kern="1200" baseline="0" dirty="0" smtClean="0">
+                <a:solidFill>
+                  <a:schemeClr val="tx1"/>
+                </a:solidFill>
+                <a:effectLst/>
+                <a:latin typeface="+mn-lt"/>
+                <a:ea typeface="+mn-ea"/>
+                <a:cs typeface="+mn-cs"/>
+              </a:rPr>
+              <a:t> wystąpienie elementów (np. po klasie) a nie kompletny tekst / zawartość – może łatwo ulec zmianie </a:t>
+            </a:r>
+            <a:endParaRPr lang="pl-PL" sz="1200" b="0" i="0" kern="1200" dirty="0" smtClean="0">
               <a:solidFill>
                 <a:schemeClr val="tx1"/>
               </a:solidFill>
@@ -7196,43 +7079,91 @@
             </a:endParaRPr>
           </a:p>
           <a:p>
-            <a:r>
-              <a:rPr lang="pl-PL" sz="1200" kern="1200" dirty="0" smtClean="0">
-                <a:solidFill>
-                  <a:schemeClr val="tx1"/>
-                </a:solidFill>
-                <a:effectLst/>
-                <a:latin typeface="+mn-lt"/>
-                <a:ea typeface="+mn-ea"/>
-                <a:cs typeface="+mn-cs"/>
-                <a:hlinkClick r:id="rId4"/>
-              </a:rPr>
-              <a:t>https://docs.google.com/folder/d/0B5KGduKl6s6-c3dlMWVNcTJhLUk/edit?docId=0B5KGduKl6s6-YjZILWd1WEJMRUU</a:t>
-            </a:r>
-            <a:endParaRPr lang="pl-PL" sz="1200" kern="1200" dirty="0" smtClean="0">
-              <a:solidFill>
-                <a:schemeClr val="tx1"/>
-              </a:solidFill>
-              <a:effectLst/>
-              <a:latin typeface="+mn-lt"/>
-              <a:ea typeface="+mn-ea"/>
-              <a:cs typeface="+mn-cs"/>
-            </a:endParaRPr>
-          </a:p>
-          <a:p>
-            <a:r>
-              <a:rPr lang="pl-PL" sz="1200" kern="1200" dirty="0" smtClean="0">
-                <a:solidFill>
-                  <a:schemeClr val="tx1"/>
-                </a:solidFill>
-                <a:effectLst/>
-                <a:latin typeface="+mn-lt"/>
-                <a:ea typeface="+mn-ea"/>
-                <a:cs typeface="+mn-cs"/>
-                <a:hlinkClick r:id="rId5"/>
-              </a:rPr>
-              <a:t>http://code.google.com/p/selenium/issues/detail?id=4107</a:t>
-            </a:r>
+            <a:pPr marL="228600" indent="-228600" rtl="0" fontAlgn="ctr">
+              <a:buAutoNum type="arabicParenR"/>
+            </a:pPr>
+            <a:r>
+              <a:rPr lang="pl-PL" sz="1200" b="0" i="0" kern="1200" dirty="0" smtClean="0">
+                <a:solidFill>
+                  <a:schemeClr val="tx1"/>
+                </a:solidFill>
+                <a:effectLst/>
+                <a:latin typeface="+mn-lt"/>
+                <a:ea typeface="+mn-ea"/>
+                <a:cs typeface="+mn-cs"/>
+              </a:rPr>
+              <a:t>Podejście oparte o cały zespół</a:t>
+            </a:r>
+          </a:p>
+          <a:p>
+            <a:pPr marL="685800" lvl="1" indent="-228600" rtl="0" fontAlgn="ctr">
+              <a:buAutoNum type="arabicParenR"/>
+            </a:pPr>
+            <a:r>
+              <a:rPr lang="pl-PL" sz="1200" b="0" i="0" kern="1200" dirty="0" smtClean="0">
+                <a:solidFill>
+                  <a:schemeClr val="tx1"/>
+                </a:solidFill>
+                <a:effectLst/>
+                <a:latin typeface="+mn-lt"/>
+                <a:ea typeface="+mn-ea"/>
+                <a:cs typeface="+mn-cs"/>
+              </a:rPr>
+              <a:t>Wspólna odpowiedzialność za testy - szczególnie utrzymanie już istniejącego ich zestawu - stąd warto aby wspólny język z kodem aplikacji</a:t>
+            </a:r>
+          </a:p>
+          <a:p>
+            <a:pPr marL="685800" lvl="1" indent="-228600" rtl="0" fontAlgn="ctr">
+              <a:buAutoNum type="arabicParenR"/>
+            </a:pPr>
+            <a:r>
+              <a:rPr lang="pl-PL" sz="1200" b="0" i="0" kern="1200" dirty="0" smtClean="0">
+                <a:solidFill>
+                  <a:schemeClr val="tx1"/>
+                </a:solidFill>
+                <a:effectLst/>
+                <a:latin typeface="+mn-lt"/>
+                <a:ea typeface="+mn-ea"/>
+                <a:cs typeface="+mn-cs"/>
+              </a:rPr>
+              <a:t>Testy przydatne dla realizujących funkcjonalności - uruchomienie testu zamiast ręcznego przygotowywania środowiska za każdym razem </a:t>
+            </a:r>
+          </a:p>
+          <a:p>
+            <a:pPr marL="685800" lvl="1" indent="-228600" rtl="0" fontAlgn="ctr">
+              <a:buAutoNum type="arabicParenR"/>
+            </a:pPr>
+            <a:r>
+              <a:rPr lang="pl-PL" sz="1200" b="0" i="0" kern="1200" dirty="0" smtClean="0">
+                <a:solidFill>
+                  <a:schemeClr val="tx1"/>
+                </a:solidFill>
+                <a:effectLst/>
+                <a:latin typeface="+mn-lt"/>
+                <a:ea typeface="+mn-ea"/>
+                <a:cs typeface="+mn-cs"/>
+              </a:rPr>
+              <a:t>Testy przydatne jako specyfikacje dla PM </a:t>
+            </a:r>
+          </a:p>
+          <a:p>
+            <a:pPr marL="685800" lvl="1" indent="-228600" rtl="0" fontAlgn="ctr">
+              <a:buAutoNum type="arabicParenR"/>
+            </a:pPr>
+            <a:r>
+              <a:rPr lang="pl-PL" sz="1200" b="0" i="0" kern="1200" dirty="0" smtClean="0">
+                <a:solidFill>
+                  <a:schemeClr val="tx1"/>
+                </a:solidFill>
+                <a:effectLst/>
+                <a:latin typeface="+mn-lt"/>
+                <a:ea typeface="+mn-ea"/>
+                <a:cs typeface="+mn-cs"/>
+              </a:rPr>
+              <a:t>Krótkie iteracje - realizacja kolejnych testów razem z funkcjonalnościami </a:t>
+            </a:r>
+          </a:p>
+          <a:p>
             <a:endParaRPr lang="en-US" dirty="0"/>
           </a:p>
         </p:txBody>
@@ -7263,7 +7194,7 @@
     </p:spTree>
     <p:extLst>
       <p:ext uri="{BB962C8B-B14F-4D97-AF65-F5344CB8AC3E}">
-        <p14:creationId xmlns:p14="http://schemas.microsoft.com/office/powerpoint/2010/main" val="2739613348"/>
+        <p14:creationId xmlns:p14="http://schemas.microsoft.com/office/powerpoint/2010/main" val="3905152230"/>
       </p:ext>
     </p:extLst>
   </p:cSld>
@@ -7745,15 +7676,163 @@
             </a:pPr>
             <a:r>
               <a:rPr lang="pl-PL" baseline="0" dirty="0" smtClean="0"/>
-              <a:t>Pierwszy PO posiada dedykowane metody, które bezpośrednio korzystają z sterownika celem </a:t>
-            </a:r>
-            <a:r>
-              <a:rPr lang="pl-PL" baseline="0" dirty="0" err="1" smtClean="0"/>
-              <a:t>slekcji</a:t>
-            </a:r>
-            <a:r>
-              <a:rPr lang="pl-PL" baseline="0" dirty="0" smtClean="0"/>
-              <a:t> elementów</a:t>
+              <a:t>Wysoki poziom abstrakcji - </a:t>
+            </a:r>
+            <a:r>
+              <a:rPr lang="pl-PL" sz="1200" b="0" i="0" kern="1200" dirty="0" smtClean="0">
+                <a:solidFill>
+                  <a:schemeClr val="tx1"/>
+                </a:solidFill>
+                <a:effectLst/>
+                <a:latin typeface="+mn-lt"/>
+                <a:ea typeface="+mn-ea"/>
+                <a:cs typeface="+mn-cs"/>
+              </a:rPr>
+              <a:t>Pojedyncza operacja powinna zwykle wykonać wiele akcji na driverze np. </a:t>
+            </a:r>
+            <a:r>
+              <a:rPr lang="pl-PL" sz="1200" b="0" i="0" kern="1200" dirty="0" err="1" smtClean="0">
+                <a:solidFill>
+                  <a:schemeClr val="tx1"/>
+                </a:solidFill>
+                <a:effectLst/>
+                <a:latin typeface="+mn-lt"/>
+                <a:ea typeface="+mn-ea"/>
+                <a:cs typeface="+mn-cs"/>
+              </a:rPr>
+              <a:t>Fill</a:t>
+            </a:r>
+            <a:r>
+              <a:rPr lang="pl-PL" sz="1200" b="0" i="0" kern="1200" dirty="0" smtClean="0">
+                <a:solidFill>
+                  <a:schemeClr val="tx1"/>
+                </a:solidFill>
+                <a:effectLst/>
+                <a:latin typeface="+mn-lt"/>
+                <a:ea typeface="+mn-ea"/>
+                <a:cs typeface="+mn-cs"/>
+              </a:rPr>
+              <a:t> </a:t>
+            </a:r>
+            <a:r>
+              <a:rPr lang="pl-PL" sz="1200" b="0" i="0" kern="1200" dirty="0" err="1" smtClean="0">
+                <a:solidFill>
+                  <a:schemeClr val="tx1"/>
+                </a:solidFill>
+                <a:effectLst/>
+                <a:latin typeface="+mn-lt"/>
+                <a:ea typeface="+mn-ea"/>
+                <a:cs typeface="+mn-cs"/>
+              </a:rPr>
+              <a:t>InAddress</a:t>
+            </a:r>
+            <a:r>
+              <a:rPr lang="pl-PL" sz="1200" b="0" i="0" kern="1200" dirty="0" smtClean="0">
+                <a:solidFill>
+                  <a:schemeClr val="tx1"/>
+                </a:solidFill>
+                <a:effectLst/>
+                <a:latin typeface="+mn-lt"/>
+                <a:ea typeface="+mn-ea"/>
+                <a:cs typeface="+mn-cs"/>
+              </a:rPr>
+              <a:t>(…) zamiast FillInStreetLine1(…), </a:t>
+            </a:r>
+            <a:r>
+              <a:rPr lang="pl-PL" sz="1200" b="0" i="0" kern="1200" dirty="0" err="1" smtClean="0">
+                <a:solidFill>
+                  <a:schemeClr val="tx1"/>
+                </a:solidFill>
+                <a:effectLst/>
+                <a:latin typeface="+mn-lt"/>
+                <a:ea typeface="+mn-ea"/>
+                <a:cs typeface="+mn-cs"/>
+              </a:rPr>
+              <a:t>FillInZipCode</a:t>
+            </a:r>
+            <a:r>
+              <a:rPr lang="pl-PL" sz="1200" b="0" i="0" kern="1200" dirty="0" smtClean="0">
+                <a:solidFill>
+                  <a:schemeClr val="tx1"/>
+                </a:solidFill>
+                <a:effectLst/>
+                <a:latin typeface="+mn-lt"/>
+                <a:ea typeface="+mn-ea"/>
+                <a:cs typeface="+mn-cs"/>
+              </a:rPr>
+              <a:t>(…). Jeden przycisk Login na stronie może mieć różne zachowanie zależnie od podanych na stronie wartości, dlatego w PO może pojawić się dla niego wiele metod: </a:t>
+            </a:r>
+            <a:r>
+              <a:rPr lang="pl-PL" sz="1200" b="0" i="0" kern="1200" dirty="0" err="1" smtClean="0">
+                <a:solidFill>
+                  <a:schemeClr val="tx1"/>
+                </a:solidFill>
+                <a:effectLst/>
+                <a:latin typeface="+mn-lt"/>
+                <a:ea typeface="+mn-ea"/>
+                <a:cs typeface="+mn-cs"/>
+              </a:rPr>
+              <a:t>LoginAsCorrectCustomer</a:t>
+            </a:r>
+            <a:r>
+              <a:rPr lang="pl-PL" sz="1200" b="0" i="0" kern="1200" dirty="0" smtClean="0">
+                <a:solidFill>
+                  <a:schemeClr val="tx1"/>
+                </a:solidFill>
+                <a:effectLst/>
+                <a:latin typeface="+mn-lt"/>
+                <a:ea typeface="+mn-ea"/>
+                <a:cs typeface="+mn-cs"/>
+              </a:rPr>
+              <a:t>, </a:t>
+            </a:r>
+            <a:r>
+              <a:rPr lang="pl-PL" sz="1200" b="0" i="0" kern="1200" dirty="0" err="1" smtClean="0">
+                <a:solidFill>
+                  <a:schemeClr val="tx1"/>
+                </a:solidFill>
+                <a:effectLst/>
+                <a:latin typeface="+mn-lt"/>
+                <a:ea typeface="+mn-ea"/>
+                <a:cs typeface="+mn-cs"/>
+              </a:rPr>
+              <a:t>LoginAsRegionAdministrator</a:t>
+            </a:r>
+            <a:r>
+              <a:rPr lang="pl-PL" sz="1200" b="0" i="0" kern="1200" dirty="0" smtClean="0">
+                <a:solidFill>
+                  <a:schemeClr val="tx1"/>
+                </a:solidFill>
+                <a:effectLst/>
+                <a:latin typeface="+mn-lt"/>
+                <a:ea typeface="+mn-ea"/>
+                <a:cs typeface="+mn-cs"/>
+              </a:rPr>
+              <a:t>(region), </a:t>
+            </a:r>
+            <a:r>
+              <a:rPr lang="pl-PL" sz="1200" b="0" i="0" kern="1200" dirty="0" err="1" smtClean="0">
+                <a:solidFill>
+                  <a:schemeClr val="tx1"/>
+                </a:solidFill>
+                <a:effectLst/>
+                <a:latin typeface="+mn-lt"/>
+                <a:ea typeface="+mn-ea"/>
+                <a:cs typeface="+mn-cs"/>
+              </a:rPr>
+              <a:t>LoginWithRole</a:t>
+            </a:r>
+            <a:r>
+              <a:rPr lang="pl-PL" sz="1200" b="0" i="0" kern="1200" dirty="0" smtClean="0">
+                <a:solidFill>
+                  <a:schemeClr val="tx1"/>
+                </a:solidFill>
+                <a:effectLst/>
+                <a:latin typeface="+mn-lt"/>
+                <a:ea typeface="+mn-ea"/>
+                <a:cs typeface="+mn-cs"/>
+              </a:rPr>
+              <a:t>(role) itp. Które mają różną logikę oraz mogą zwracać różne PO na wyjściu</a:t>
             </a:r>
           </a:p>
           <a:p>
@@ -7761,8 +7840,64 @@
               <a:buAutoNum type="arabicParenR"/>
             </a:pPr>
             <a:r>
-              <a:rPr lang="pl-PL" baseline="0" dirty="0" smtClean="0"/>
-              <a:t>W drugim tworzymy właściwości celem uniknięcia duplikacji</a:t>
+              <a:rPr lang="pl-PL" sz="1200" b="0" i="0" kern="1200" dirty="0" err="1" smtClean="0">
+                <a:solidFill>
+                  <a:schemeClr val="tx1"/>
+                </a:solidFill>
+                <a:effectLst/>
+                <a:latin typeface="+mn-lt"/>
+                <a:ea typeface="+mn-ea"/>
+                <a:cs typeface="+mn-cs"/>
+              </a:rPr>
+              <a:t>Fluent</a:t>
+            </a:r>
+            <a:r>
+              <a:rPr lang="pl-PL" sz="1200" b="0" i="0" kern="1200" dirty="0" smtClean="0">
+                <a:solidFill>
+                  <a:schemeClr val="tx1"/>
+                </a:solidFill>
+                <a:effectLst/>
+                <a:latin typeface="+mn-lt"/>
+                <a:ea typeface="+mn-ea"/>
+                <a:cs typeface="+mn-cs"/>
+              </a:rPr>
+              <a:t> </a:t>
+            </a:r>
+            <a:r>
+              <a:rPr lang="pl-PL" sz="1200" b="0" i="0" kern="1200" dirty="0" err="1" smtClean="0">
+                <a:solidFill>
+                  <a:schemeClr val="tx1"/>
+                </a:solidFill>
+                <a:effectLst/>
+                <a:latin typeface="+mn-lt"/>
+                <a:ea typeface="+mn-ea"/>
+                <a:cs typeface="+mn-cs"/>
+              </a:rPr>
+              <a:t>kłopotiliwy</a:t>
+            </a:r>
+            <a:r>
+              <a:rPr lang="pl-PL" sz="1200" b="0" i="0" kern="1200" baseline="0" dirty="0" smtClean="0">
+                <a:solidFill>
+                  <a:schemeClr val="tx1"/>
+                </a:solidFill>
+                <a:effectLst/>
+                <a:latin typeface="+mn-lt"/>
+                <a:ea typeface="+mn-ea"/>
+                <a:cs typeface="+mn-cs"/>
+              </a:rPr>
+              <a:t> w debugowaniu </a:t>
+            </a:r>
+            <a:r>
+              <a:rPr lang="pl-PL" sz="1200" b="0" i="0" kern="1200" dirty="0" smtClean="0">
+                <a:solidFill>
+                  <a:schemeClr val="tx1"/>
+                </a:solidFill>
+                <a:effectLst/>
+                <a:latin typeface="+mn-lt"/>
+                <a:ea typeface="+mn-ea"/>
+                <a:cs typeface="+mn-cs"/>
+              </a:rPr>
+              <a:t>- używaj z rozwagą tylko w obrębie jednej strony, przy interakcji nazywaj explicite zmienną</a:t>
             </a:r>
           </a:p>
           <a:p>
@@ -7770,50 +7905,16 @@
               <a:buAutoNum type="arabicParenR"/>
             </a:pPr>
             <a:r>
-              <a:rPr lang="pl-PL" strike="sngStrike" baseline="0" dirty="0" smtClean="0"/>
-              <a:t>W trzecim pokazujemy jak wykorzystać </a:t>
-            </a:r>
-            <a:r>
-              <a:rPr lang="pl-PL" strike="sngStrike" baseline="0" dirty="0" err="1" smtClean="0"/>
-              <a:t>PageFactory</a:t>
-            </a:r>
-            <a:r>
-              <a:rPr lang="pl-PL" strike="sngStrike" baseline="0" dirty="0" smtClean="0"/>
-              <a:t> do dalszego uproszczenia </a:t>
-            </a:r>
-            <a:r>
-              <a:rPr lang="pl-PL" strike="sngStrike" baseline="0" dirty="0" err="1" smtClean="0"/>
-              <a:t>Page</a:t>
-            </a:r>
-            <a:r>
-              <a:rPr lang="pl-PL" strike="sngStrike" baseline="0" dirty="0" smtClean="0"/>
-              <a:t> </a:t>
-            </a:r>
-            <a:r>
-              <a:rPr lang="pl-PL" strike="sngStrike" baseline="0" dirty="0" err="1" smtClean="0"/>
-              <a:t>Objectu</a:t>
-            </a:r>
-            <a:r>
-              <a:rPr lang="pl-PL" strike="sngStrike" baseline="0" dirty="0" smtClean="0"/>
-              <a:t> </a:t>
-            </a:r>
-            <a:endParaRPr lang="pl-PL" strike="sngStrike" baseline="0" dirty="0" smtClean="0"/>
-          </a:p>
-          <a:p>
-            <a:pPr marL="0" indent="0">
-              <a:buNone/>
-            </a:pPr>
-            <a:r>
-              <a:rPr lang="pl-PL" baseline="0" dirty="0" smtClean="0"/>
-              <a:t>4) Problemy z </a:t>
-            </a:r>
-            <a:r>
-              <a:rPr lang="pl-PL" baseline="0" dirty="0" err="1" smtClean="0"/>
-              <a:t>PageFactory</a:t>
-            </a:r>
-            <a:r>
-              <a:rPr lang="pl-PL" baseline="0" dirty="0" smtClean="0"/>
-              <a:t> wykryte podczas ewaluacji</a:t>
+              <a:rPr lang="pl-PL" sz="1200" b="0" i="0" kern="1200" dirty="0" smtClean="0">
+                <a:solidFill>
+                  <a:schemeClr val="tx1"/>
+                </a:solidFill>
+                <a:effectLst/>
+                <a:latin typeface="+mn-lt"/>
+                <a:ea typeface="+mn-ea"/>
+                <a:cs typeface="+mn-cs"/>
+              </a:rPr>
+              <a:t>Jako, że PO to klasy to użyteczne jest dla nich zastosowanie koncepcji OOP</a:t>
             </a:r>
           </a:p>
           <a:p>
@@ -7821,14 +7922,16 @@
               <a:buAutoNum type="arabicParenR"/>
             </a:pPr>
             <a:r>
-              <a:rPr lang="pl-PL" baseline="0" dirty="0" smtClean="0"/>
-              <a:t>Wywołane za wcześnie potrafi nie działać </a:t>
-            </a:r>
-            <a:r>
-              <a:rPr lang="pl-PL" baseline="0" dirty="0" smtClean="0">
-                <a:sym typeface="Wingdings" pitchFamily="2" charset="2"/>
-              </a:rPr>
-              <a:t></a:t>
+              <a:rPr lang="pl-PL" sz="1200" b="0" i="0" kern="1200" dirty="0" smtClean="0">
+                <a:solidFill>
+                  <a:schemeClr val="tx1"/>
+                </a:solidFill>
+                <a:effectLst/>
+                <a:latin typeface="+mn-lt"/>
+                <a:ea typeface="+mn-ea"/>
+                <a:cs typeface="+mn-cs"/>
+              </a:rPr>
+              <a:t>Bazowa klasa PO - np. sprawdzenia poprawności  tytułu/lokacji aktualnej strony drivera, czy </a:t>
             </a:r>
           </a:p>
           <a:p>
@@ -7836,22 +7939,40 @@
               <a:buAutoNum type="arabicParenR"/>
             </a:pPr>
             <a:r>
-              <a:rPr lang="pl-PL" baseline="0" dirty="0" smtClean="0">
-                <a:sym typeface="Wingdings" pitchFamily="2" charset="2"/>
-              </a:rPr>
-              <a:t>Nie działa dla kolekcji </a:t>
-            </a:r>
-            <a:r>
-              <a:rPr lang="pl-PL" baseline="0" dirty="0" err="1" smtClean="0">
-                <a:sym typeface="Wingdings" pitchFamily="2" charset="2"/>
-              </a:rPr>
-              <a:t>IWebElementów</a:t>
-            </a:r>
-            <a:r>
-              <a:rPr lang="pl-PL" baseline="0" dirty="0" smtClean="0">
-                <a:sym typeface="Wingdings" pitchFamily="2" charset="2"/>
-              </a:rPr>
-              <a:t> (wersja C#)</a:t>
+              <a:rPr lang="pl-PL" sz="1200" b="0" i="0" kern="1200" dirty="0" smtClean="0">
+                <a:solidFill>
+                  <a:schemeClr val="tx1"/>
+                </a:solidFill>
+                <a:effectLst/>
+                <a:latin typeface="+mn-lt"/>
+                <a:ea typeface="+mn-ea"/>
+                <a:cs typeface="+mn-cs"/>
+              </a:rPr>
+              <a:t>Jeśli strona reprezentuje różne zachowanie np. dla różnych  użytkowników (np. dla zwykłych użytkowników tylko do odczytu a dla administratora</a:t>
+            </a:r>
+            <a:r>
+              <a:rPr lang="pl-PL" sz="1200" b="0" i="0" kern="1200" baseline="0" dirty="0" smtClean="0">
+                <a:solidFill>
+                  <a:schemeClr val="tx1"/>
+                </a:solidFill>
+                <a:effectLst/>
+                <a:latin typeface="+mn-lt"/>
+                <a:ea typeface="+mn-ea"/>
+                <a:cs typeface="+mn-cs"/>
+              </a:rPr>
+              <a:t> </a:t>
+            </a:r>
+            <a:r>
+              <a:rPr lang="pl-PL" sz="1200" b="0" i="0" kern="1200" dirty="0" smtClean="0">
+                <a:solidFill>
+                  <a:schemeClr val="tx1"/>
+                </a:solidFill>
+                <a:effectLst/>
+                <a:latin typeface="+mn-lt"/>
+                <a:ea typeface="+mn-ea"/>
+                <a:cs typeface="+mn-cs"/>
+              </a:rPr>
+              <a:t>możliwość zapisu) to warto pomyśleć o oddzielnych PO z być może wspólną klasą bazową (poza w/w)</a:t>
             </a:r>
           </a:p>
           <a:p>
@@ -7859,87 +7980,70 @@
               <a:buAutoNum type="arabicParenR"/>
             </a:pPr>
             <a:r>
-              <a:rPr lang="pl-PL" baseline="0" dirty="0" smtClean="0">
-                <a:sym typeface="Wingdings" pitchFamily="2" charset="2"/>
-              </a:rPr>
-              <a:t>Nie wspieraj </a:t>
-            </a:r>
-            <a:r>
-              <a:rPr lang="pl-PL" baseline="0" dirty="0" err="1" smtClean="0">
-                <a:sym typeface="Wingdings" pitchFamily="2" charset="2"/>
-              </a:rPr>
-              <a:t>waitów</a:t>
-            </a:r>
-            <a:endParaRPr lang="pl-PL" baseline="0" dirty="0" smtClean="0">
-              <a:sym typeface="Wingdings" pitchFamily="2" charset="2"/>
+              <a:rPr lang="pl-PL" sz="1200" b="0" i="0" kern="1200" dirty="0" smtClean="0">
+                <a:solidFill>
+                  <a:schemeClr val="tx1"/>
+                </a:solidFill>
+                <a:effectLst/>
+                <a:latin typeface="+mn-lt"/>
+                <a:ea typeface="+mn-ea"/>
+                <a:cs typeface="+mn-cs"/>
+              </a:rPr>
+              <a:t>Kompozycja przydatna dla komponentów/</a:t>
+            </a:r>
+            <a:r>
+              <a:rPr lang="pl-PL" sz="1200" b="0" i="0" kern="1200" dirty="0" err="1" smtClean="0">
+                <a:solidFill>
+                  <a:schemeClr val="tx1"/>
+                </a:solidFill>
+                <a:effectLst/>
+                <a:latin typeface="+mn-lt"/>
+                <a:ea typeface="+mn-ea"/>
+                <a:cs typeface="+mn-cs"/>
+              </a:rPr>
+              <a:t>widgetów</a:t>
+            </a:r>
+            <a:r>
+              <a:rPr lang="pl-PL" sz="1200" b="0" i="0" kern="1200" dirty="0" smtClean="0">
+                <a:solidFill>
+                  <a:schemeClr val="tx1"/>
+                </a:solidFill>
+                <a:effectLst/>
+                <a:latin typeface="+mn-lt"/>
+                <a:ea typeface="+mn-ea"/>
+                <a:cs typeface="+mn-cs"/>
+              </a:rPr>
+              <a:t> występujących na wielu stronach. </a:t>
+            </a:r>
+          </a:p>
+          <a:p>
+            <a:pPr marL="228600" lvl="0" indent="-228600">
+              <a:buAutoNum type="arabicParenR"/>
+            </a:pPr>
+            <a:r>
+              <a:rPr lang="pl-PL" sz="1200" b="0" i="0" kern="1200" dirty="0" smtClean="0">
+                <a:solidFill>
+                  <a:schemeClr val="tx1"/>
+                </a:solidFill>
+                <a:effectLst/>
+                <a:latin typeface="+mn-lt"/>
+                <a:ea typeface="+mn-ea"/>
+                <a:cs typeface="+mn-cs"/>
+              </a:rPr>
+              <a:t>Przekazywanie kontekstu pomiędzy PO - poza sterownikiem może być przydatne zapamiętanie wcześniejszych wyborów od których może zależeć dalsza interakcja w ramach kolejnych PO</a:t>
+            </a:r>
+          </a:p>
+          <a:p>
+            <a:pPr rtl="0" fontAlgn="ctr"/>
+            <a:endParaRPr lang="pl-PL" sz="1200" b="0" i="0" kern="1200" dirty="0" smtClean="0">
+              <a:solidFill>
+                <a:schemeClr val="tx1"/>
+              </a:solidFill>
+              <a:effectLst/>
+              <a:latin typeface="+mn-lt"/>
+              <a:ea typeface="+mn-ea"/>
+              <a:cs typeface="+mn-cs"/>
             </a:endParaRPr>
-          </a:p>
-          <a:p>
-            <a:pPr marL="457200" lvl="1" indent="0">
-              <a:buNone/>
-            </a:pPr>
-            <a:r>
-              <a:rPr lang="pl-PL" baseline="0" dirty="0" smtClean="0">
-                <a:sym typeface="Wingdings" pitchFamily="2" charset="2"/>
-              </a:rPr>
-              <a:t>4) Alternatywą napisanie własnej realizacji</a:t>
-            </a:r>
-          </a:p>
-          <a:p>
-            <a:pPr marL="0" lvl="0" indent="0">
-              <a:buNone/>
-            </a:pPr>
-            <a:endParaRPr lang="pl-PL" baseline="0" dirty="0" smtClean="0"/>
-          </a:p>
-          <a:p>
-            <a:pPr marL="0" marR="0" lvl="0" indent="0" algn="l" defTabSz="914400" rtl="0" eaLnBrk="1" fontAlgn="auto" latinLnBrk="0" hangingPunct="1">
-              <a:lnSpc>
-                <a:spcPct val="100000"/>
-              </a:lnSpc>
-              <a:spcBef>
-                <a:spcPts val="0"/>
-              </a:spcBef>
-              <a:spcAft>
-                <a:spcPts val="0"/>
-              </a:spcAft>
-              <a:buClrTx/>
-              <a:buSzTx/>
-              <a:buFontTx/>
-              <a:buNone/>
-              <a:tabLst/>
-              <a:defRPr/>
-            </a:pPr>
-            <a:r>
-              <a:rPr lang="pl-PL" sz="1200" b="1" i="0" kern="1200" dirty="0" smtClean="0">
-                <a:solidFill>
-                  <a:schemeClr val="tx1"/>
-                </a:solidFill>
-                <a:effectLst/>
-                <a:latin typeface="+mn-lt"/>
-                <a:ea typeface="+mn-ea"/>
-                <a:cs typeface="+mn-cs"/>
-              </a:rPr>
-              <a:t>Odnośniki</a:t>
-            </a:r>
-          </a:p>
-          <a:p>
-            <a:pPr marL="0" lvl="0" indent="0">
-              <a:buNone/>
-            </a:pPr>
-            <a:r>
-              <a:rPr lang="pl-PL" sz="1200" kern="1200" dirty="0" smtClean="0">
-                <a:solidFill>
-                  <a:schemeClr val="tx1"/>
-                </a:solidFill>
-                <a:effectLst/>
-                <a:latin typeface="+mn-lt"/>
-                <a:ea typeface="+mn-ea"/>
-                <a:cs typeface="+mn-cs"/>
-                <a:hlinkClick r:id="rId3"/>
-              </a:rPr>
-              <a:t>http://shanmugavelc.blogspot.com/2011/10/pageobjects-and-pagefactory-selenium-20.html</a:t>
-            </a:r>
-            <a:endParaRPr lang="pl-PL" baseline="0" dirty="0" smtClean="0"/>
           </a:p>
         </p:txBody>
       </p:sp>
@@ -7969,7 +8073,7 @@
     </p:spTree>
     <p:extLst>
       <p:ext uri="{BB962C8B-B14F-4D97-AF65-F5344CB8AC3E}">
-        <p14:creationId xmlns:p14="http://schemas.microsoft.com/office/powerpoint/2010/main" val="4121352361"/>
+        <p14:creationId xmlns:p14="http://schemas.microsoft.com/office/powerpoint/2010/main" val="486377979"/>
       </p:ext>
     </p:extLst>
   </p:cSld>
@@ -8160,7 +8264,7 @@
           <a:p>
             <a:fld id="{D30BB303-ADEB-436F-8582-99928D5EC1B6}" type="datetimeFigureOut">
               <a:rPr lang="pl-PL" smtClean="0"/>
-              <a:t>2013-01-15</a:t>
+              <a:t>2013-02-10</a:t>
             </a:fld>
             <a:endParaRPr lang="pl-PL"/>
           </a:p>
@@ -8326,7 +8430,7 @@
           <a:p>
             <a:fld id="{D30BB303-ADEB-436F-8582-99928D5EC1B6}" type="datetimeFigureOut">
               <a:rPr lang="pl-PL" smtClean="0"/>
-              <a:t>2013-01-15</a:t>
+              <a:t>2013-02-10</a:t>
             </a:fld>
             <a:endParaRPr lang="pl-PL"/>
           </a:p>
@@ -8502,7 +8606,7 @@
           <a:p>
             <a:fld id="{D30BB303-ADEB-436F-8582-99928D5EC1B6}" type="datetimeFigureOut">
               <a:rPr lang="pl-PL" smtClean="0"/>
-              <a:t>2013-01-15</a:t>
+              <a:t>2013-02-10</a:t>
             </a:fld>
             <a:endParaRPr lang="pl-PL"/>
           </a:p>
@@ -8668,7 +8772,7 @@
           <a:p>
             <a:fld id="{D30BB303-ADEB-436F-8582-99928D5EC1B6}" type="datetimeFigureOut">
               <a:rPr lang="pl-PL" smtClean="0"/>
-              <a:t>2013-01-15</a:t>
+              <a:t>2013-02-10</a:t>
             </a:fld>
             <a:endParaRPr lang="pl-PL"/>
           </a:p>
@@ -8910,7 +9014,7 @@
           <a:p>
             <a:fld id="{D30BB303-ADEB-436F-8582-99928D5EC1B6}" type="datetimeFigureOut">
               <a:rPr lang="pl-PL" smtClean="0"/>
-              <a:t>2013-01-15</a:t>
+              <a:t>2013-02-10</a:t>
             </a:fld>
             <a:endParaRPr lang="pl-PL"/>
           </a:p>
@@ -9194,7 +9298,7 @@
           <a:p>
             <a:fld id="{D30BB303-ADEB-436F-8582-99928D5EC1B6}" type="datetimeFigureOut">
               <a:rPr lang="pl-PL" smtClean="0"/>
-              <a:t>2013-01-15</a:t>
+              <a:t>2013-02-10</a:t>
             </a:fld>
             <a:endParaRPr lang="pl-PL"/>
           </a:p>
@@ -9612,7 +9716,7 @@
           <a:p>
             <a:fld id="{D30BB303-ADEB-436F-8582-99928D5EC1B6}" type="datetimeFigureOut">
               <a:rPr lang="pl-PL" smtClean="0"/>
-              <a:t>2013-01-15</a:t>
+              <a:t>2013-02-10</a:t>
             </a:fld>
             <a:endParaRPr lang="pl-PL"/>
           </a:p>
@@ -9726,7 +9830,7 @@
           <a:p>
             <a:fld id="{D30BB303-ADEB-436F-8582-99928D5EC1B6}" type="datetimeFigureOut">
               <a:rPr lang="pl-PL" smtClean="0"/>
-              <a:t>2013-01-15</a:t>
+              <a:t>2013-02-10</a:t>
             </a:fld>
             <a:endParaRPr lang="pl-PL"/>
           </a:p>
@@ -9817,7 +9921,7 @@
           <a:p>
             <a:fld id="{D30BB303-ADEB-436F-8582-99928D5EC1B6}" type="datetimeFigureOut">
               <a:rPr lang="pl-PL" smtClean="0"/>
-              <a:t>2013-01-15</a:t>
+              <a:t>2013-02-10</a:t>
             </a:fld>
             <a:endParaRPr lang="pl-PL"/>
           </a:p>
@@ -10090,7 +10194,7 @@
           <a:p>
             <a:fld id="{D30BB303-ADEB-436F-8582-99928D5EC1B6}" type="datetimeFigureOut">
               <a:rPr lang="pl-PL" smtClean="0"/>
-              <a:t>2013-01-15</a:t>
+              <a:t>2013-02-10</a:t>
             </a:fld>
             <a:endParaRPr lang="pl-PL"/>
           </a:p>
@@ -10339,7 +10443,7 @@
           <a:p>
             <a:fld id="{D30BB303-ADEB-436F-8582-99928D5EC1B6}" type="datetimeFigureOut">
               <a:rPr lang="pl-PL" smtClean="0"/>
-              <a:t>2013-01-15</a:t>
+              <a:t>2013-02-10</a:t>
             </a:fld>
             <a:endParaRPr lang="pl-PL"/>
           </a:p>
@@ -10575,7 +10679,7 @@
           <a:p>
             <a:fld id="{D30BB303-ADEB-436F-8582-99928D5EC1B6}" type="datetimeFigureOut">
               <a:rPr lang="pl-PL" smtClean="0"/>
-              <a:t>2013-01-15</a:t>
+              <a:t>2013-02-10</a:t>
             </a:fld>
             <a:endParaRPr lang="pl-PL"/>
           </a:p>
@@ -11101,452 +11205,6 @@
       </p:grpSpPr>
       <p:sp>
         <p:nvSpPr>
-          <p:cNvPr id="10" name="Tytuł 9"/>
-          <p:cNvSpPr>
-            <a:spLocks noGrp="1"/>
-          </p:cNvSpPr>
-          <p:nvPr>
-            <p:ph type="title"/>
-          </p:nvPr>
-        </p:nvSpPr>
-        <p:spPr/>
-        <p:txBody>
-          <a:bodyPr/>
-          <a:lstStyle/>
-          <a:p>
-            <a:r>
-              <a:rPr lang="pl-PL" dirty="0" smtClean="0"/>
-              <a:t>Demo</a:t>
-            </a:r>
-            <a:endParaRPr lang="en-US" dirty="0"/>
-          </a:p>
-        </p:txBody>
-      </p:sp>
-      <p:pic>
-        <p:nvPicPr>
-          <p:cNvPr id="12" name="Picture 2" descr="http://seleniumhq.org/images/big-logo.png"/>
-          <p:cNvPicPr>
-            <a:picLocks noChangeAspect="1" noChangeArrowheads="1"/>
-          </p:cNvPicPr>
-          <p:nvPr/>
-        </p:nvPicPr>
-        <p:blipFill>
-          <a:blip r:embed="rId3">
-            <a:extLst>
-              <a:ext uri="{28A0092B-C50C-407E-A947-70E740481C1C}">
-                <a14:useLocalDpi xmlns:a14="http://schemas.microsoft.com/office/drawing/2010/main" val="0"/>
-              </a:ext>
-            </a:extLst>
-          </a:blip>
-          <a:srcRect/>
-          <a:stretch>
-            <a:fillRect/>
-          </a:stretch>
-        </p:blipFill>
-        <p:spPr bwMode="auto">
-          <a:xfrm>
-            <a:off x="1999637" y="260648"/>
-            <a:ext cx="1432203" cy="1296144"/>
-          </a:xfrm>
-          <a:prstGeom prst="rect">
-            <a:avLst/>
-          </a:prstGeom>
-          <a:noFill/>
-          <a:extLst>
-            <a:ext uri="{909E8E84-426E-40DD-AFC4-6F175D3DCCD1}">
-              <a14:hiddenFill xmlns:a14="http://schemas.microsoft.com/office/drawing/2010/main">
-                <a:solidFill>
-                  <a:srgbClr val="FFFFFF"/>
-                </a:solidFill>
-              </a14:hiddenFill>
-            </a:ext>
-          </a:extLst>
-        </p:spPr>
-      </p:pic>
-      <p:sp>
-        <p:nvSpPr>
-          <p:cNvPr id="14" name="Content Placeholder 2"/>
-          <p:cNvSpPr>
-            <a:spLocks noGrp="1"/>
-          </p:cNvSpPr>
-          <p:nvPr>
-            <p:ph idx="1"/>
-          </p:nvPr>
-        </p:nvSpPr>
-        <p:spPr>
-          <a:xfrm>
-            <a:off x="457200" y="2143397"/>
-            <a:ext cx="8229600" cy="3661867"/>
-          </a:xfrm>
-        </p:spPr>
-        <p:txBody>
-          <a:bodyPr>
-            <a:noAutofit/>
-          </a:bodyPr>
-          <a:lstStyle/>
-          <a:p>
-            <a:pPr>
-              <a:buFont typeface="Arial" charset="0"/>
-              <a:buChar char="•"/>
-            </a:pPr>
-            <a:r>
-              <a:rPr lang="pl-PL" sz="3400" dirty="0" smtClean="0"/>
-              <a:t>stworzenie </a:t>
-            </a:r>
-            <a:r>
-              <a:rPr lang="pl-PL" sz="3400" dirty="0" err="1" smtClean="0"/>
-              <a:t>Page</a:t>
-            </a:r>
-            <a:r>
-              <a:rPr lang="pl-PL" sz="3400" dirty="0" smtClean="0"/>
-              <a:t> Object dla poprzedniego testu</a:t>
-            </a:r>
-          </a:p>
-          <a:p>
-            <a:pPr>
-              <a:buFont typeface="Arial" charset="0"/>
-              <a:buChar char="•"/>
-            </a:pPr>
-            <a:r>
-              <a:rPr lang="pl-PL" sz="3400" dirty="0" err="1" smtClean="0"/>
-              <a:t>refaktoring</a:t>
-            </a:r>
-            <a:r>
-              <a:rPr lang="pl-PL" sz="3400" dirty="0" smtClean="0"/>
-              <a:t> selekcji elementów</a:t>
-            </a:r>
-          </a:p>
-          <a:p>
-            <a:pPr>
-              <a:buFont typeface="Arial" charset="0"/>
-              <a:buChar char="•"/>
-            </a:pPr>
-            <a:r>
-              <a:rPr lang="pl-PL" sz="3400" dirty="0" err="1" smtClean="0"/>
-              <a:t>PageFactory</a:t>
-            </a:r>
-            <a:endParaRPr lang="pl-PL" sz="3400" dirty="0" smtClean="0"/>
-          </a:p>
-        </p:txBody>
-      </p:sp>
-      <p:cxnSp>
-        <p:nvCxnSpPr>
-          <p:cNvPr id="3" name="Łącznik prostoliniowy 2"/>
-          <p:cNvCxnSpPr/>
-          <p:nvPr/>
-        </p:nvCxnSpPr>
-        <p:spPr>
-          <a:xfrm>
-            <a:off x="755576" y="4221088"/>
-            <a:ext cx="2448272" cy="0"/>
-          </a:xfrm>
-          <a:prstGeom prst="line">
-            <a:avLst/>
-          </a:prstGeom>
-          <a:ln w="25400">
-            <a:solidFill>
-              <a:schemeClr val="tx1"/>
-            </a:solidFill>
-          </a:ln>
-        </p:spPr>
-        <p:style>
-          <a:lnRef idx="1">
-            <a:schemeClr val="accent1"/>
-          </a:lnRef>
-          <a:fillRef idx="0">
-            <a:schemeClr val="accent1"/>
-          </a:fillRef>
-          <a:effectRef idx="0">
-            <a:schemeClr val="accent1"/>
-          </a:effectRef>
-          <a:fontRef idx="minor">
-            <a:schemeClr val="tx1"/>
-          </a:fontRef>
-        </p:style>
-      </p:cxnSp>
-    </p:spTree>
-    <p:extLst>
-      <p:ext uri="{BB962C8B-B14F-4D97-AF65-F5344CB8AC3E}">
-        <p14:creationId xmlns:p14="http://schemas.microsoft.com/office/powerpoint/2010/main" val="1369911116"/>
-      </p:ext>
-    </p:extLst>
-  </p:cSld>
-  <p:clrMapOvr>
-    <a:masterClrMapping/>
-  </p:clrMapOvr>
-  <p:timing>
-    <p:tnLst>
-      <p:par>
-        <p:cTn id="1" dur="indefinite" restart="never" nodeType="tmRoot">
-          <p:childTnLst>
-            <p:seq concurrent="1" nextAc="seek">
-              <p:cTn id="2" dur="indefinite" nodeType="mainSeq">
-                <p:childTnLst>
-                  <p:par>
-                    <p:cTn id="3" fill="hold">
-                      <p:stCondLst>
-                        <p:cond delay="indefinite"/>
-                      </p:stCondLst>
-                      <p:childTnLst>
-                        <p:par>
-                          <p:cTn id="4" fill="hold">
-                            <p:stCondLst>
-                              <p:cond delay="0"/>
-                            </p:stCondLst>
-                            <p:childTnLst>
-                              <p:par>
-                                <p:cTn id="5" presetID="10" presetClass="entr" presetSubtype="0" fill="hold" grpId="0" nodeType="clickEffect">
-                                  <p:stCondLst>
-                                    <p:cond delay="0"/>
-                                  </p:stCondLst>
-                                  <p:childTnLst>
-                                    <p:set>
-                                      <p:cBhvr>
-                                        <p:cTn id="6" dur="1" fill="hold">
-                                          <p:stCondLst>
-                                            <p:cond delay="0"/>
-                                          </p:stCondLst>
-                                        </p:cTn>
-                                        <p:tgtEl>
-                                          <p:spTgt spid="14">
-                                            <p:txEl>
-                                              <p:pRg st="0" end="0"/>
-                                            </p:txEl>
-                                          </p:spTgt>
-                                        </p:tgtEl>
-                                        <p:attrNameLst>
-                                          <p:attrName>style.visibility</p:attrName>
-                                        </p:attrNameLst>
-                                      </p:cBhvr>
-                                      <p:to>
-                                        <p:strVal val="visible"/>
-                                      </p:to>
-                                    </p:set>
-                                    <p:animEffect transition="in" filter="fade">
-                                      <p:cBhvr>
-                                        <p:cTn id="7" dur="500"/>
-                                        <p:tgtEl>
-                                          <p:spTgt spid="14">
-                                            <p:txEl>
-                                              <p:pRg st="0" end="0"/>
-                                            </p:txEl>
-                                          </p:spTgt>
-                                        </p:tgtEl>
-                                      </p:cBhvr>
-                                    </p:animEffect>
-                                  </p:childTnLst>
-                                </p:cTn>
-                              </p:par>
-                            </p:childTnLst>
-                          </p:cTn>
-                        </p:par>
-                      </p:childTnLst>
-                    </p:cTn>
-                  </p:par>
-                  <p:par>
-                    <p:cTn id="8" fill="hold">
-                      <p:stCondLst>
-                        <p:cond delay="indefinite"/>
-                      </p:stCondLst>
-                      <p:childTnLst>
-                        <p:par>
-                          <p:cTn id="9" fill="hold">
-                            <p:stCondLst>
-                              <p:cond delay="0"/>
-                            </p:stCondLst>
-                            <p:childTnLst>
-                              <p:par>
-                                <p:cTn id="10" presetID="10" presetClass="entr" presetSubtype="0" fill="hold" grpId="0" nodeType="clickEffect">
-                                  <p:stCondLst>
-                                    <p:cond delay="0"/>
-                                  </p:stCondLst>
-                                  <p:childTnLst>
-                                    <p:set>
-                                      <p:cBhvr>
-                                        <p:cTn id="11" dur="1" fill="hold">
-                                          <p:stCondLst>
-                                            <p:cond delay="0"/>
-                                          </p:stCondLst>
-                                        </p:cTn>
-                                        <p:tgtEl>
-                                          <p:spTgt spid="14">
-                                            <p:txEl>
-                                              <p:pRg st="1" end="1"/>
-                                            </p:txEl>
-                                          </p:spTgt>
-                                        </p:tgtEl>
-                                        <p:attrNameLst>
-                                          <p:attrName>style.visibility</p:attrName>
-                                        </p:attrNameLst>
-                                      </p:cBhvr>
-                                      <p:to>
-                                        <p:strVal val="visible"/>
-                                      </p:to>
-                                    </p:set>
-                                    <p:animEffect transition="in" filter="fade">
-                                      <p:cBhvr>
-                                        <p:cTn id="12" dur="500"/>
-                                        <p:tgtEl>
-                                          <p:spTgt spid="14">
-                                            <p:txEl>
-                                              <p:pRg st="1" end="1"/>
-                                            </p:txEl>
-                                          </p:spTgt>
-                                        </p:tgtEl>
-                                      </p:cBhvr>
-                                    </p:animEffect>
-                                  </p:childTnLst>
-                                </p:cTn>
-                              </p:par>
-                            </p:childTnLst>
-                          </p:cTn>
-                        </p:par>
-                      </p:childTnLst>
-                    </p:cTn>
-                  </p:par>
-                  <p:par>
-                    <p:cTn id="13" fill="hold">
-                      <p:stCondLst>
-                        <p:cond delay="indefinite"/>
-                      </p:stCondLst>
-                      <p:childTnLst>
-                        <p:par>
-                          <p:cTn id="14" fill="hold">
-                            <p:stCondLst>
-                              <p:cond delay="0"/>
-                            </p:stCondLst>
-                            <p:childTnLst>
-                              <p:par>
-                                <p:cTn id="15" presetID="10" presetClass="entr" presetSubtype="0" fill="hold" grpId="0" nodeType="clickEffect">
-                                  <p:stCondLst>
-                                    <p:cond delay="0"/>
-                                  </p:stCondLst>
-                                  <p:childTnLst>
-                                    <p:set>
-                                      <p:cBhvr>
-                                        <p:cTn id="16" dur="1" fill="hold">
-                                          <p:stCondLst>
-                                            <p:cond delay="0"/>
-                                          </p:stCondLst>
-                                        </p:cTn>
-                                        <p:tgtEl>
-                                          <p:spTgt spid="14">
-                                            <p:txEl>
-                                              <p:pRg st="2" end="2"/>
-                                            </p:txEl>
-                                          </p:spTgt>
-                                        </p:tgtEl>
-                                        <p:attrNameLst>
-                                          <p:attrName>style.visibility</p:attrName>
-                                        </p:attrNameLst>
-                                      </p:cBhvr>
-                                      <p:to>
-                                        <p:strVal val="visible"/>
-                                      </p:to>
-                                    </p:set>
-                                    <p:animEffect transition="in" filter="fade">
-                                      <p:cBhvr>
-                                        <p:cTn id="17" dur="500"/>
-                                        <p:tgtEl>
-                                          <p:spTgt spid="14">
-                                            <p:txEl>
-                                              <p:pRg st="2" end="2"/>
-                                            </p:txEl>
-                                          </p:spTgt>
-                                        </p:tgtEl>
-                                      </p:cBhvr>
-                                    </p:animEffect>
-                                  </p:childTnLst>
-                                </p:cTn>
-                              </p:par>
-                              <p:par>
-                                <p:cTn id="18" presetID="10" presetClass="entr" presetSubtype="0" fill="hold" nodeType="withEffect">
-                                  <p:stCondLst>
-                                    <p:cond delay="0"/>
-                                  </p:stCondLst>
-                                  <p:childTnLst>
-                                    <p:set>
-                                      <p:cBhvr>
-                                        <p:cTn id="19" dur="1" fill="hold">
-                                          <p:stCondLst>
-                                            <p:cond delay="0"/>
-                                          </p:stCondLst>
-                                        </p:cTn>
-                                        <p:tgtEl>
-                                          <p:spTgt spid="3"/>
-                                        </p:tgtEl>
-                                        <p:attrNameLst>
-                                          <p:attrName>style.visibility</p:attrName>
-                                        </p:attrNameLst>
-                                      </p:cBhvr>
-                                      <p:to>
-                                        <p:strVal val="visible"/>
-                                      </p:to>
-                                    </p:set>
-                                    <p:animEffect transition="in" filter="fade">
-                                      <p:cBhvr>
-                                        <p:cTn id="20" dur="500"/>
-                                        <p:tgtEl>
-                                          <p:spTgt spid="3"/>
-                                        </p:tgtEl>
-                                      </p:cBhvr>
-                                    </p:animEffect>
-                                  </p:childTnLst>
-                                </p:cTn>
-                              </p:par>
-                            </p:childTnLst>
-                          </p:cTn>
-                        </p:par>
-                      </p:childTnLst>
-                    </p:cTn>
-                  </p:par>
-                </p:childTnLst>
-              </p:cTn>
-              <p:prevCondLst>
-                <p:cond evt="onPrev" delay="0">
-                  <p:tgtEl>
-                    <p:sldTgt/>
-                  </p:tgtEl>
-                </p:cond>
-              </p:prevCondLst>
-              <p:nextCondLst>
-                <p:cond evt="onNext" delay="0">
-                  <p:tgtEl>
-                    <p:sldTgt/>
-                  </p:tgtEl>
-                </p:cond>
-              </p:nextCondLst>
-            </p:seq>
-          </p:childTnLst>
-        </p:cTn>
-      </p:par>
-    </p:tnLst>
-    <p:bldLst>
-      <p:bldP spid="14" grpId="0" uiExpand="1" build="p"/>
-    </p:bldLst>
-  </p:timing>
-</p:sld>
-</file>
-
-<file path=ppt/slides/slide11.xml><?xml version="1.0" encoding="utf-8"?>
-<p:sld xmlns:a="http://schemas.openxmlformats.org/drawingml/2006/main" xmlns:r="http://schemas.openxmlformats.org/officeDocument/2006/relationships" xmlns:p="http://schemas.openxmlformats.org/presentationml/2006/main">
-  <p:cSld>
-    <p:spTree>
-      <p:nvGrpSpPr>
-        <p:cNvPr id="1" name=""/>
-        <p:cNvGrpSpPr/>
-        <p:nvPr/>
-      </p:nvGrpSpPr>
-      <p:grpSpPr>
-        <a:xfrm>
-          <a:off x="0" y="0"/>
-          <a:ext cx="0" cy="0"/>
-          <a:chOff x="0" y="0"/>
-          <a:chExt cx="0" cy="0"/>
-        </a:xfrm>
-      </p:grpSpPr>
-      <p:sp>
-        <p:nvSpPr>
           <p:cNvPr id="2" name="Title 1"/>
           <p:cNvSpPr>
             <a:spLocks noGrp="1"/>
@@ -11958,6 +11616,330 @@
 </p:sld>
 </file>
 
+<file path=ppt/slides/slide11.xml><?xml version="1.0" encoding="utf-8"?>
+<p:sld xmlns:a="http://schemas.openxmlformats.org/drawingml/2006/main" xmlns:r="http://schemas.openxmlformats.org/officeDocument/2006/relationships" xmlns:p="http://schemas.openxmlformats.org/presentationml/2006/main">
+  <p:cSld>
+    <p:spTree>
+      <p:nvGrpSpPr>
+        <p:cNvPr id="1" name=""/>
+        <p:cNvGrpSpPr/>
+        <p:nvPr/>
+      </p:nvGrpSpPr>
+      <p:grpSpPr>
+        <a:xfrm>
+          <a:off x="0" y="0"/>
+          <a:ext cx="0" cy="0"/>
+          <a:chOff x="0" y="0"/>
+          <a:chExt cx="0" cy="0"/>
+        </a:xfrm>
+      </p:grpSpPr>
+      <p:sp>
+        <p:nvSpPr>
+          <p:cNvPr id="10" name="Tytuł 9"/>
+          <p:cNvSpPr>
+            <a:spLocks noGrp="1"/>
+          </p:cNvSpPr>
+          <p:nvPr>
+            <p:ph type="title"/>
+          </p:nvPr>
+        </p:nvSpPr>
+        <p:spPr/>
+        <p:txBody>
+          <a:bodyPr/>
+          <a:lstStyle/>
+          <a:p>
+            <a:r>
+              <a:rPr lang="pl-PL" dirty="0" smtClean="0"/>
+              <a:t>Demo</a:t>
+            </a:r>
+            <a:endParaRPr lang="en-US" dirty="0"/>
+          </a:p>
+        </p:txBody>
+      </p:sp>
+      <p:pic>
+        <p:nvPicPr>
+          <p:cNvPr id="12" name="Picture 2" descr="http://seleniumhq.org/images/big-logo.png"/>
+          <p:cNvPicPr>
+            <a:picLocks noChangeAspect="1" noChangeArrowheads="1"/>
+          </p:cNvPicPr>
+          <p:nvPr/>
+        </p:nvPicPr>
+        <p:blipFill>
+          <a:blip r:embed="rId3">
+            <a:extLst>
+              <a:ext uri="{28A0092B-C50C-407E-A947-70E740481C1C}">
+                <a14:useLocalDpi xmlns:a14="http://schemas.microsoft.com/office/drawing/2010/main" val="0"/>
+              </a:ext>
+            </a:extLst>
+          </a:blip>
+          <a:srcRect/>
+          <a:stretch>
+            <a:fillRect/>
+          </a:stretch>
+        </p:blipFill>
+        <p:spPr bwMode="auto">
+          <a:xfrm>
+            <a:off x="1999637" y="260648"/>
+            <a:ext cx="1432203" cy="1296144"/>
+          </a:xfrm>
+          <a:prstGeom prst="rect">
+            <a:avLst/>
+          </a:prstGeom>
+          <a:noFill/>
+          <a:extLst>
+            <a:ext uri="{909E8E84-426E-40DD-AFC4-6F175D3DCCD1}">
+              <a14:hiddenFill xmlns:a14="http://schemas.microsoft.com/office/drawing/2010/main">
+                <a:solidFill>
+                  <a:srgbClr val="FFFFFF"/>
+                </a:solidFill>
+              </a14:hiddenFill>
+            </a:ext>
+          </a:extLst>
+        </p:spPr>
+      </p:pic>
+      <p:sp>
+        <p:nvSpPr>
+          <p:cNvPr id="14" name="Content Placeholder 2"/>
+          <p:cNvSpPr>
+            <a:spLocks noGrp="1"/>
+          </p:cNvSpPr>
+          <p:nvPr>
+            <p:ph idx="1"/>
+          </p:nvPr>
+        </p:nvSpPr>
+        <p:spPr>
+          <a:xfrm>
+            <a:off x="457200" y="2143397"/>
+            <a:ext cx="8229600" cy="3661867"/>
+          </a:xfrm>
+        </p:spPr>
+        <p:txBody>
+          <a:bodyPr>
+            <a:noAutofit/>
+          </a:bodyPr>
+          <a:lstStyle/>
+          <a:p>
+            <a:pPr>
+              <a:buFont typeface="Arial" charset="0"/>
+              <a:buChar char="•"/>
+            </a:pPr>
+            <a:r>
+              <a:rPr lang="pl-PL" sz="3400" dirty="0" smtClean="0"/>
+              <a:t>stworzenie </a:t>
+            </a:r>
+            <a:r>
+              <a:rPr lang="pl-PL" sz="3400" dirty="0" err="1" smtClean="0"/>
+              <a:t>Page</a:t>
+            </a:r>
+            <a:r>
+              <a:rPr lang="pl-PL" sz="3400" dirty="0" smtClean="0"/>
+              <a:t> Object dla poprzedniego </a:t>
+            </a:r>
+            <a:r>
+              <a:rPr lang="pl-PL" sz="3400" dirty="0" smtClean="0"/>
+              <a:t>testu</a:t>
+            </a:r>
+            <a:endParaRPr lang="en-US" sz="3400" dirty="0" smtClean="0"/>
+          </a:p>
+          <a:p>
+            <a:pPr>
+              <a:buFont typeface="Arial" charset="0"/>
+              <a:buChar char="•"/>
+            </a:pPr>
+            <a:r>
+              <a:rPr lang="en-US" sz="3400" strike="sngStrike" dirty="0" err="1" smtClean="0"/>
+              <a:t>PageFactory</a:t>
+            </a:r>
+            <a:endParaRPr lang="pl-PL" sz="3400" strike="sngStrike" dirty="0" smtClean="0"/>
+          </a:p>
+          <a:p>
+            <a:pPr>
+              <a:buFont typeface="Arial" charset="0"/>
+              <a:buChar char="•"/>
+            </a:pPr>
+            <a:r>
+              <a:rPr lang="pl-PL" sz="3400" dirty="0" smtClean="0"/>
+              <a:t>parametryzowany </a:t>
+            </a:r>
+            <a:r>
+              <a:rPr lang="pl-PL" sz="3400" dirty="0" err="1"/>
+              <a:t>TestFixture</a:t>
+            </a:r>
+            <a:r>
+              <a:rPr lang="pl-PL" sz="3400" dirty="0"/>
+              <a:t> i inne przeglądarki</a:t>
+            </a:r>
+          </a:p>
+        </p:txBody>
+      </p:sp>
+    </p:spTree>
+    <p:extLst>
+      <p:ext uri="{BB962C8B-B14F-4D97-AF65-F5344CB8AC3E}">
+        <p14:creationId xmlns:p14="http://schemas.microsoft.com/office/powerpoint/2010/main" val="1369911116"/>
+      </p:ext>
+    </p:extLst>
+  </p:cSld>
+  <p:clrMapOvr>
+    <a:masterClrMapping/>
+  </p:clrMapOvr>
+  <p:timing>
+    <p:tnLst>
+      <p:par>
+        <p:cTn id="1" dur="indefinite" restart="never" nodeType="tmRoot">
+          <p:childTnLst>
+            <p:seq concurrent="1" nextAc="seek">
+              <p:cTn id="2" dur="indefinite" nodeType="mainSeq">
+                <p:childTnLst>
+                  <p:par>
+                    <p:cTn id="3" fill="hold">
+                      <p:stCondLst>
+                        <p:cond delay="indefinite"/>
+                      </p:stCondLst>
+                      <p:childTnLst>
+                        <p:par>
+                          <p:cTn id="4" fill="hold">
+                            <p:stCondLst>
+                              <p:cond delay="0"/>
+                            </p:stCondLst>
+                            <p:childTnLst>
+                              <p:par>
+                                <p:cTn id="5" presetID="10" presetClass="entr" presetSubtype="0" fill="hold" grpId="0" nodeType="clickEffect">
+                                  <p:stCondLst>
+                                    <p:cond delay="0"/>
+                                  </p:stCondLst>
+                                  <p:childTnLst>
+                                    <p:set>
+                                      <p:cBhvr>
+                                        <p:cTn id="6" dur="1" fill="hold">
+                                          <p:stCondLst>
+                                            <p:cond delay="0"/>
+                                          </p:stCondLst>
+                                        </p:cTn>
+                                        <p:tgtEl>
+                                          <p:spTgt spid="14">
+                                            <p:txEl>
+                                              <p:pRg st="0" end="0"/>
+                                            </p:txEl>
+                                          </p:spTgt>
+                                        </p:tgtEl>
+                                        <p:attrNameLst>
+                                          <p:attrName>style.visibility</p:attrName>
+                                        </p:attrNameLst>
+                                      </p:cBhvr>
+                                      <p:to>
+                                        <p:strVal val="visible"/>
+                                      </p:to>
+                                    </p:set>
+                                    <p:animEffect transition="in" filter="fade">
+                                      <p:cBhvr>
+                                        <p:cTn id="7" dur="500"/>
+                                        <p:tgtEl>
+                                          <p:spTgt spid="14">
+                                            <p:txEl>
+                                              <p:pRg st="0" end="0"/>
+                                            </p:txEl>
+                                          </p:spTgt>
+                                        </p:tgtEl>
+                                      </p:cBhvr>
+                                    </p:animEffect>
+                                  </p:childTnLst>
+                                </p:cTn>
+                              </p:par>
+                            </p:childTnLst>
+                          </p:cTn>
+                        </p:par>
+                      </p:childTnLst>
+                    </p:cTn>
+                  </p:par>
+                  <p:par>
+                    <p:cTn id="8" fill="hold">
+                      <p:stCondLst>
+                        <p:cond delay="indefinite"/>
+                      </p:stCondLst>
+                      <p:childTnLst>
+                        <p:par>
+                          <p:cTn id="9" fill="hold">
+                            <p:stCondLst>
+                              <p:cond delay="0"/>
+                            </p:stCondLst>
+                            <p:childTnLst>
+                              <p:par>
+                                <p:cTn id="10" presetID="10" presetClass="entr" presetSubtype="0" fill="hold" grpId="0" nodeType="clickEffect">
+                                  <p:stCondLst>
+                                    <p:cond delay="0"/>
+                                  </p:stCondLst>
+                                  <p:childTnLst>
+                                    <p:set>
+                                      <p:cBhvr>
+                                        <p:cTn id="11" dur="1" fill="hold">
+                                          <p:stCondLst>
+                                            <p:cond delay="0"/>
+                                          </p:stCondLst>
+                                        </p:cTn>
+                                        <p:tgtEl>
+                                          <p:spTgt spid="14">
+                                            <p:txEl>
+                                              <p:pRg st="1" end="1"/>
+                                            </p:txEl>
+                                          </p:spTgt>
+                                        </p:tgtEl>
+                                        <p:attrNameLst>
+                                          <p:attrName>style.visibility</p:attrName>
+                                        </p:attrNameLst>
+                                      </p:cBhvr>
+                                      <p:to>
+                                        <p:strVal val="visible"/>
+                                      </p:to>
+                                    </p:set>
+                                    <p:animEffect transition="in" filter="fade">
+                                      <p:cBhvr>
+                                        <p:cTn id="12" dur="500"/>
+                                        <p:tgtEl>
+                                          <p:spTgt spid="14">
+                                            <p:txEl>
+                                              <p:pRg st="1" end="1"/>
+                                            </p:txEl>
+                                          </p:spTgt>
+                                        </p:tgtEl>
+                                      </p:cBhvr>
+                                    </p:animEffect>
+                                  </p:childTnLst>
+                                </p:cTn>
+                              </p:par>
+                            </p:childTnLst>
+                          </p:cTn>
+                        </p:par>
+                      </p:childTnLst>
+                    </p:cTn>
+                  </p:par>
+                </p:childTnLst>
+              </p:cTn>
+              <p:prevCondLst>
+                <p:cond evt="onPrev" delay="0">
+                  <p:tgtEl>
+                    <p:sldTgt/>
+                  </p:tgtEl>
+                </p:cond>
+              </p:prevCondLst>
+              <p:nextCondLst>
+                <p:cond evt="onNext" delay="0">
+                  <p:tgtEl>
+                    <p:sldTgt/>
+                  </p:tgtEl>
+                </p:cond>
+              </p:nextCondLst>
+            </p:seq>
+          </p:childTnLst>
+        </p:cTn>
+      </p:par>
+    </p:tnLst>
+    <p:bldLst>
+      <p:bldP spid="14" grpId="0" uiExpand="1" build="p"/>
+    </p:bldLst>
+  </p:timing>
+</p:sld>
+</file>
+
 <file path=ppt/slides/slide12.xml><?xml version="1.0" encoding="utf-8"?>
 <p:sld xmlns:a="http://schemas.openxmlformats.org/drawingml/2006/main" xmlns:r="http://schemas.openxmlformats.org/officeDocument/2006/relationships" xmlns:p="http://schemas.openxmlformats.org/presentationml/2006/main">
   <p:cSld>
@@ -12033,21 +12015,6 @@
             <a:r>
               <a:rPr lang="pl-PL" dirty="0" err="1" smtClean="0"/>
               <a:t>DriverService</a:t>
-            </a:r>
-            <a:endParaRPr lang="pl-PL" dirty="0" smtClean="0"/>
-          </a:p>
-          <a:p>
-            <a:r>
-              <a:rPr lang="pl-PL" dirty="0" err="1" smtClean="0"/>
-              <a:t>explicit</a:t>
-            </a:r>
-            <a:r>
-              <a:rPr lang="pl-PL" dirty="0" smtClean="0"/>
-              <a:t> </a:t>
-            </a:r>
-            <a:r>
-              <a:rPr lang="pl-PL" dirty="0" err="1" smtClean="0"/>
-              <a:t>waits</a:t>
             </a:r>
             <a:endParaRPr lang="pl-PL" dirty="0" smtClean="0"/>
           </a:p>
@@ -12359,67 +12326,6 @@
                                           <p:spTgt spid="3">
                                             <p:txEl>
                                               <p:pRg st="3" end="3"/>
-                                            </p:txEl>
-                                          </p:spTgt>
-                                        </p:tgtEl>
-                                      </p:cBhvr>
-                                    </p:animEffect>
-                                  </p:childTnLst>
-                                </p:cTn>
-                              </p:par>
-                            </p:childTnLst>
-                          </p:cTn>
-                        </p:par>
-                      </p:childTnLst>
-                    </p:cTn>
-                  </p:par>
-                  <p:par>
-                    <p:cTn id="23" fill="hold">
-                      <p:stCondLst>
-                        <p:cond delay="indefinite"/>
-                      </p:stCondLst>
-                      <p:childTnLst>
-                        <p:par>
-                          <p:cTn id="24" fill="hold">
-                            <p:stCondLst>
-                              <p:cond delay="0"/>
-                            </p:stCondLst>
-                            <p:childTnLst>
-                              <p:par>
-                                <p:cTn id="25" presetID="10" presetClass="entr" presetSubtype="0" fill="hold" grpId="0" nodeType="clickEffect">
-                                  <p:stCondLst>
-                                    <p:cond delay="0"/>
-                                  </p:stCondLst>
-                                  <p:childTnLst>
-                                    <p:set>
-                                      <p:cBhvr>
-                                        <p:cTn id="26" dur="1" fill="hold">
-                                          <p:stCondLst>
-                                            <p:cond delay="0"/>
-                                          </p:stCondLst>
-                                        </p:cTn>
-                                        <p:tgtEl>
-                                          <p:spTgt spid="3">
-                                            <p:txEl>
-                                              <p:pRg st="4" end="4"/>
-                                            </p:txEl>
-                                          </p:spTgt>
-                                        </p:tgtEl>
-                                        <p:attrNameLst>
-                                          <p:attrName>style.visibility</p:attrName>
-                                        </p:attrNameLst>
-                                      </p:cBhvr>
-                                      <p:to>
-                                        <p:strVal val="visible"/>
-                                      </p:to>
-                                    </p:set>
-                                    <p:animEffect transition="in" filter="fade">
-                                      <p:cBhvr>
-                                        <p:cTn id="27" dur="500"/>
-                                        <p:tgtEl>
-                                          <p:spTgt spid="3">
-                                            <p:txEl>
-                                              <p:pRg st="4" end="4"/>
                                             </p:txEl>
                                           </p:spTgt>
                                         </p:tgtEl>
@@ -14391,6 +14297,320 @@
       </p:grpSpPr>
       <p:sp>
         <p:nvSpPr>
+          <p:cNvPr id="10" name="Tytuł 9"/>
+          <p:cNvSpPr>
+            <a:spLocks noGrp="1"/>
+          </p:cNvSpPr>
+          <p:nvPr>
+            <p:ph type="title"/>
+          </p:nvPr>
+        </p:nvSpPr>
+        <p:spPr/>
+        <p:txBody>
+          <a:bodyPr/>
+          <a:lstStyle/>
+          <a:p>
+            <a:r>
+              <a:rPr lang="pl-PL" dirty="0" smtClean="0"/>
+              <a:t>Demo</a:t>
+            </a:r>
+            <a:endParaRPr lang="en-US" dirty="0"/>
+          </a:p>
+        </p:txBody>
+      </p:sp>
+      <p:pic>
+        <p:nvPicPr>
+          <p:cNvPr id="12" name="Picture 2" descr="http://seleniumhq.org/images/big-logo.png"/>
+          <p:cNvPicPr>
+            <a:picLocks noChangeAspect="1" noChangeArrowheads="1"/>
+          </p:cNvPicPr>
+          <p:nvPr/>
+        </p:nvPicPr>
+        <p:blipFill>
+          <a:blip r:embed="rId3">
+            <a:extLst>
+              <a:ext uri="{28A0092B-C50C-407E-A947-70E740481C1C}">
+                <a14:useLocalDpi xmlns:a14="http://schemas.microsoft.com/office/drawing/2010/main" val="0"/>
+              </a:ext>
+            </a:extLst>
+          </a:blip>
+          <a:srcRect/>
+          <a:stretch>
+            <a:fillRect/>
+          </a:stretch>
+        </p:blipFill>
+        <p:spPr bwMode="auto">
+          <a:xfrm>
+            <a:off x="1999637" y="260648"/>
+            <a:ext cx="1432203" cy="1296144"/>
+          </a:xfrm>
+          <a:prstGeom prst="rect">
+            <a:avLst/>
+          </a:prstGeom>
+          <a:noFill/>
+          <a:extLst>
+            <a:ext uri="{909E8E84-426E-40DD-AFC4-6F175D3DCCD1}">
+              <a14:hiddenFill xmlns:a14="http://schemas.microsoft.com/office/drawing/2010/main">
+                <a:solidFill>
+                  <a:srgbClr val="FFFFFF"/>
+                </a:solidFill>
+              </a14:hiddenFill>
+            </a:ext>
+          </a:extLst>
+        </p:spPr>
+      </p:pic>
+      <p:sp>
+        <p:nvSpPr>
+          <p:cNvPr id="14" name="Content Placeholder 2"/>
+          <p:cNvSpPr>
+            <a:spLocks noGrp="1"/>
+          </p:cNvSpPr>
+          <p:nvPr>
+            <p:ph idx="1"/>
+          </p:nvPr>
+        </p:nvSpPr>
+        <p:spPr>
+          <a:xfrm>
+            <a:off x="457200" y="2143397"/>
+            <a:ext cx="8229600" cy="3661867"/>
+          </a:xfrm>
+        </p:spPr>
+        <p:txBody>
+          <a:bodyPr>
+            <a:noAutofit/>
+          </a:bodyPr>
+          <a:lstStyle/>
+          <a:p>
+            <a:pPr>
+              <a:buFont typeface="Arial" charset="0"/>
+              <a:buChar char="•"/>
+            </a:pPr>
+            <a:r>
+              <a:rPr lang="pl-PL" sz="3400" dirty="0" smtClean="0"/>
+              <a:t>aplikacja sklepu</a:t>
+            </a:r>
+            <a:endParaRPr lang="pl-PL" sz="3400" dirty="0"/>
+          </a:p>
+          <a:p>
+            <a:pPr>
+              <a:buFont typeface="Arial" charset="0"/>
+              <a:buChar char="•"/>
+            </a:pPr>
+            <a:r>
+              <a:rPr lang="en-US" sz="3400" dirty="0" err="1" smtClean="0"/>
+              <a:t>podstawowa</a:t>
+            </a:r>
+            <a:r>
+              <a:rPr lang="en-US" sz="3400" dirty="0" smtClean="0"/>
+              <a:t> </a:t>
+            </a:r>
+            <a:r>
+              <a:rPr lang="en-US" sz="3400" dirty="0" err="1" smtClean="0"/>
+              <a:t>wersja</a:t>
+            </a:r>
+            <a:r>
+              <a:rPr lang="en-US" sz="3400" dirty="0" smtClean="0"/>
+              <a:t> </a:t>
+            </a:r>
+            <a:r>
+              <a:rPr lang="en-US" sz="3400" dirty="0" err="1" smtClean="0"/>
+              <a:t>testu</a:t>
+            </a:r>
+            <a:r>
+              <a:rPr lang="en-US" sz="3400" dirty="0" smtClean="0"/>
+              <a:t> </a:t>
+            </a:r>
+            <a:endParaRPr lang="pl-PL" sz="3400" dirty="0" smtClean="0"/>
+          </a:p>
+        </p:txBody>
+      </p:sp>
+    </p:spTree>
+    <p:extLst>
+      <p:ext uri="{BB962C8B-B14F-4D97-AF65-F5344CB8AC3E}">
+        <p14:creationId xmlns:p14="http://schemas.microsoft.com/office/powerpoint/2010/main" val="3022742935"/>
+      </p:ext>
+    </p:extLst>
+  </p:cSld>
+  <p:clrMapOvr>
+    <a:masterClrMapping/>
+  </p:clrMapOvr>
+  <p:timing>
+    <p:tnLst>
+      <p:par>
+        <p:cTn id="1" dur="indefinite" restart="never" nodeType="tmRoot">
+          <p:childTnLst>
+            <p:seq concurrent="1" nextAc="seek">
+              <p:cTn id="2" dur="indefinite" nodeType="mainSeq">
+                <p:childTnLst>
+                  <p:par>
+                    <p:cTn id="3" fill="hold">
+                      <p:stCondLst>
+                        <p:cond delay="indefinite"/>
+                      </p:stCondLst>
+                      <p:childTnLst>
+                        <p:par>
+                          <p:cTn id="4" fill="hold">
+                            <p:stCondLst>
+                              <p:cond delay="0"/>
+                            </p:stCondLst>
+                            <p:childTnLst>
+                              <p:par>
+                                <p:cTn id="5" presetID="10" presetClass="entr" presetSubtype="0" fill="hold" grpId="0" nodeType="clickEffect">
+                                  <p:stCondLst>
+                                    <p:cond delay="0"/>
+                                  </p:stCondLst>
+                                  <p:childTnLst>
+                                    <p:set>
+                                      <p:cBhvr>
+                                        <p:cTn id="6" dur="1" fill="hold">
+                                          <p:stCondLst>
+                                            <p:cond delay="0"/>
+                                          </p:stCondLst>
+                                        </p:cTn>
+                                        <p:tgtEl>
+                                          <p:spTgt spid="14">
+                                            <p:txEl>
+                                              <p:pRg st="0" end="0"/>
+                                            </p:txEl>
+                                          </p:spTgt>
+                                        </p:tgtEl>
+                                        <p:attrNameLst>
+                                          <p:attrName>style.visibility</p:attrName>
+                                        </p:attrNameLst>
+                                      </p:cBhvr>
+                                      <p:to>
+                                        <p:strVal val="visible"/>
+                                      </p:to>
+                                    </p:set>
+                                    <p:animEffect transition="in" filter="fade">
+                                      <p:cBhvr>
+                                        <p:cTn id="7" dur="500"/>
+                                        <p:tgtEl>
+                                          <p:spTgt spid="14">
+                                            <p:txEl>
+                                              <p:pRg st="0" end="0"/>
+                                            </p:txEl>
+                                          </p:spTgt>
+                                        </p:tgtEl>
+                                      </p:cBhvr>
+                                    </p:animEffect>
+                                  </p:childTnLst>
+                                </p:cTn>
+                              </p:par>
+                            </p:childTnLst>
+                          </p:cTn>
+                        </p:par>
+                      </p:childTnLst>
+                    </p:cTn>
+                  </p:par>
+                  <p:par>
+                    <p:cTn id="8" fill="hold">
+                      <p:stCondLst>
+                        <p:cond delay="indefinite"/>
+                      </p:stCondLst>
+                      <p:childTnLst>
+                        <p:par>
+                          <p:cTn id="9" fill="hold">
+                            <p:stCondLst>
+                              <p:cond delay="0"/>
+                            </p:stCondLst>
+                            <p:childTnLst>
+                              <p:par>
+                                <p:cTn id="10" presetID="10" presetClass="entr" presetSubtype="0" fill="hold" grpId="0" nodeType="clickEffect">
+                                  <p:stCondLst>
+                                    <p:cond delay="0"/>
+                                  </p:stCondLst>
+                                  <p:childTnLst>
+                                    <p:set>
+                                      <p:cBhvr>
+                                        <p:cTn id="11" dur="1" fill="hold">
+                                          <p:stCondLst>
+                                            <p:cond delay="0"/>
+                                          </p:stCondLst>
+                                        </p:cTn>
+                                        <p:tgtEl>
+                                          <p:spTgt spid="14">
+                                            <p:txEl>
+                                              <p:pRg st="1" end="1"/>
+                                            </p:txEl>
+                                          </p:spTgt>
+                                        </p:tgtEl>
+                                        <p:attrNameLst>
+                                          <p:attrName>style.visibility</p:attrName>
+                                        </p:attrNameLst>
+                                      </p:cBhvr>
+                                      <p:to>
+                                        <p:strVal val="visible"/>
+                                      </p:to>
+                                    </p:set>
+                                    <p:animEffect transition="in" filter="fade">
+                                      <p:cBhvr>
+                                        <p:cTn id="12" dur="500"/>
+                                        <p:tgtEl>
+                                          <p:spTgt spid="14">
+                                            <p:txEl>
+                                              <p:pRg st="1" end="1"/>
+                                            </p:txEl>
+                                          </p:spTgt>
+                                        </p:tgtEl>
+                                      </p:cBhvr>
+                                    </p:animEffect>
+                                  </p:childTnLst>
+                                </p:cTn>
+                              </p:par>
+                            </p:childTnLst>
+                          </p:cTn>
+                        </p:par>
+                      </p:childTnLst>
+                    </p:cTn>
+                  </p:par>
+                </p:childTnLst>
+              </p:cTn>
+              <p:prevCondLst>
+                <p:cond evt="onPrev" delay="0">
+                  <p:tgtEl>
+                    <p:sldTgt/>
+                  </p:tgtEl>
+                </p:cond>
+              </p:prevCondLst>
+              <p:nextCondLst>
+                <p:cond evt="onNext" delay="0">
+                  <p:tgtEl>
+                    <p:sldTgt/>
+                  </p:tgtEl>
+                </p:cond>
+              </p:nextCondLst>
+            </p:seq>
+          </p:childTnLst>
+        </p:cTn>
+      </p:par>
+    </p:tnLst>
+    <p:bldLst>
+      <p:bldP spid="14" grpId="0" build="p"/>
+    </p:bldLst>
+  </p:timing>
+</p:sld>
+</file>
+
+<file path=ppt/slides/slide7.xml><?xml version="1.0" encoding="utf-8"?>
+<p:sld xmlns:a="http://schemas.openxmlformats.org/drawingml/2006/main" xmlns:r="http://schemas.openxmlformats.org/officeDocument/2006/relationships" xmlns:p="http://schemas.openxmlformats.org/presentationml/2006/main">
+  <p:cSld>
+    <p:spTree>
+      <p:nvGrpSpPr>
+        <p:cNvPr id="1" name=""/>
+        <p:cNvGrpSpPr/>
+        <p:nvPr/>
+      </p:nvGrpSpPr>
+      <p:grpSpPr>
+        <a:xfrm>
+          <a:off x="0" y="0"/>
+          <a:ext cx="0" cy="0"/>
+          <a:chOff x="0" y="0"/>
+          <a:chExt cx="0" cy="0"/>
+        </a:xfrm>
+      </p:grpSpPr>
+      <p:sp>
+        <p:nvSpPr>
           <p:cNvPr id="2" name="Title 1"/>
           <p:cNvSpPr>
             <a:spLocks noGrp="1"/>
@@ -14822,7 +15042,7 @@
 </p:sld>
 </file>
 
-<file path=ppt/slides/slide7.xml><?xml version="1.0" encoding="utf-8"?>
+<file path=ppt/slides/slide8.xml><?xml version="1.0" encoding="utf-8"?>
 <p:sld xmlns:a="http://schemas.openxmlformats.org/drawingml/2006/main" xmlns:r="http://schemas.openxmlformats.org/officeDocument/2006/relationships" xmlns:p="http://schemas.openxmlformats.org/presentationml/2006/main">
   <p:cSld>
     <p:spTree>
@@ -15405,534 +15625,6 @@
     </p:tnLst>
     <p:bldLst>
       <p:bldP spid="3" grpId="0" build="p"/>
-    </p:bldLst>
-  </p:timing>
-</p:sld>
-</file>
-
-<file path=ppt/slides/slide8.xml><?xml version="1.0" encoding="utf-8"?>
-<p:sld xmlns:a="http://schemas.openxmlformats.org/drawingml/2006/main" xmlns:r="http://schemas.openxmlformats.org/officeDocument/2006/relationships" xmlns:p="http://schemas.openxmlformats.org/presentationml/2006/main">
-  <p:cSld>
-    <p:spTree>
-      <p:nvGrpSpPr>
-        <p:cNvPr id="1" name=""/>
-        <p:cNvGrpSpPr/>
-        <p:nvPr/>
-      </p:nvGrpSpPr>
-      <p:grpSpPr>
-        <a:xfrm>
-          <a:off x="0" y="0"/>
-          <a:ext cx="0" cy="0"/>
-          <a:chOff x="0" y="0"/>
-          <a:chExt cx="0" cy="0"/>
-        </a:xfrm>
-      </p:grpSpPr>
-      <p:sp>
-        <p:nvSpPr>
-          <p:cNvPr id="10" name="Tytuł 9"/>
-          <p:cNvSpPr>
-            <a:spLocks noGrp="1"/>
-          </p:cNvSpPr>
-          <p:nvPr>
-            <p:ph type="title"/>
-          </p:nvPr>
-        </p:nvSpPr>
-        <p:spPr/>
-        <p:txBody>
-          <a:bodyPr/>
-          <a:lstStyle/>
-          <a:p>
-            <a:r>
-              <a:rPr lang="pl-PL" dirty="0" smtClean="0"/>
-              <a:t>Demo</a:t>
-            </a:r>
-            <a:endParaRPr lang="en-US" dirty="0"/>
-          </a:p>
-        </p:txBody>
-      </p:sp>
-      <p:pic>
-        <p:nvPicPr>
-          <p:cNvPr id="12" name="Picture 2" descr="http://seleniumhq.org/images/big-logo.png"/>
-          <p:cNvPicPr>
-            <a:picLocks noChangeAspect="1" noChangeArrowheads="1"/>
-          </p:cNvPicPr>
-          <p:nvPr/>
-        </p:nvPicPr>
-        <p:blipFill>
-          <a:blip r:embed="rId3">
-            <a:extLst>
-              <a:ext uri="{28A0092B-C50C-407E-A947-70E740481C1C}">
-                <a14:useLocalDpi xmlns:a14="http://schemas.microsoft.com/office/drawing/2010/main" val="0"/>
-              </a:ext>
-            </a:extLst>
-          </a:blip>
-          <a:srcRect/>
-          <a:stretch>
-            <a:fillRect/>
-          </a:stretch>
-        </p:blipFill>
-        <p:spPr bwMode="auto">
-          <a:xfrm>
-            <a:off x="1999637" y="260648"/>
-            <a:ext cx="1432203" cy="1296144"/>
-          </a:xfrm>
-          <a:prstGeom prst="rect">
-            <a:avLst/>
-          </a:prstGeom>
-          <a:noFill/>
-          <a:extLst>
-            <a:ext uri="{909E8E84-426E-40DD-AFC4-6F175D3DCCD1}">
-              <a14:hiddenFill xmlns:a14="http://schemas.microsoft.com/office/drawing/2010/main">
-                <a:solidFill>
-                  <a:srgbClr val="FFFFFF"/>
-                </a:solidFill>
-              </a14:hiddenFill>
-            </a:ext>
-          </a:extLst>
-        </p:spPr>
-      </p:pic>
-      <p:sp>
-        <p:nvSpPr>
-          <p:cNvPr id="14" name="Content Placeholder 2"/>
-          <p:cNvSpPr>
-            <a:spLocks noGrp="1"/>
-          </p:cNvSpPr>
-          <p:nvPr>
-            <p:ph idx="1"/>
-          </p:nvPr>
-        </p:nvSpPr>
-        <p:spPr>
-          <a:xfrm>
-            <a:off x="457200" y="2143397"/>
-            <a:ext cx="8229600" cy="3661867"/>
-          </a:xfrm>
-        </p:spPr>
-        <p:txBody>
-          <a:bodyPr>
-            <a:noAutofit/>
-          </a:bodyPr>
-          <a:lstStyle/>
-          <a:p>
-            <a:pPr>
-              <a:buFont typeface="Arial" charset="0"/>
-              <a:buChar char="•"/>
-            </a:pPr>
-            <a:r>
-              <a:rPr lang="pl-PL" sz="3400" dirty="0" smtClean="0"/>
-              <a:t>aplikacja sklepu</a:t>
-            </a:r>
-            <a:endParaRPr lang="pl-PL" sz="3400" dirty="0"/>
-          </a:p>
-          <a:p>
-            <a:pPr>
-              <a:buFont typeface="Arial" charset="0"/>
-              <a:buChar char="•"/>
-            </a:pPr>
-            <a:r>
-              <a:rPr lang="pl-PL" sz="3400" dirty="0" err="1" smtClean="0"/>
-              <a:t>Selenium</a:t>
-            </a:r>
-            <a:r>
-              <a:rPr lang="pl-PL" sz="3400" dirty="0" smtClean="0"/>
-              <a:t> IDE</a:t>
-            </a:r>
-          </a:p>
-          <a:p>
-            <a:pPr>
-              <a:buFont typeface="Arial" charset="0"/>
-              <a:buChar char="•"/>
-            </a:pPr>
-            <a:r>
-              <a:rPr lang="pl-PL" sz="3400" dirty="0" err="1" smtClean="0"/>
-              <a:t>FirefoxDriver</a:t>
-            </a:r>
-            <a:endParaRPr lang="pl-PL" sz="3400" dirty="0" smtClean="0"/>
-          </a:p>
-          <a:p>
-            <a:pPr>
-              <a:buFont typeface="Arial" charset="0"/>
-              <a:buChar char="•"/>
-            </a:pPr>
-            <a:r>
-              <a:rPr lang="pl-PL" sz="3400" dirty="0" err="1" smtClean="0"/>
-              <a:t>refaktoring</a:t>
-            </a:r>
-            <a:r>
-              <a:rPr lang="pl-PL" sz="3400" dirty="0" smtClean="0"/>
-              <a:t> do </a:t>
-            </a:r>
-            <a:r>
-              <a:rPr lang="pl-PL" sz="3400" dirty="0" err="1" smtClean="0"/>
-              <a:t>IWebDriver</a:t>
-            </a:r>
-            <a:endParaRPr lang="pl-PL" sz="3400" dirty="0" smtClean="0"/>
-          </a:p>
-          <a:p>
-            <a:pPr>
-              <a:buFont typeface="Arial" charset="0"/>
-              <a:buChar char="•"/>
-            </a:pPr>
-            <a:r>
-              <a:rPr lang="pl-PL" sz="3400" dirty="0" smtClean="0"/>
-              <a:t>parametryzowany </a:t>
-            </a:r>
-            <a:r>
-              <a:rPr lang="pl-PL" sz="3400" dirty="0" err="1" smtClean="0"/>
-              <a:t>TestFixture</a:t>
-            </a:r>
-            <a:r>
-              <a:rPr lang="pl-PL" sz="3400" dirty="0" smtClean="0"/>
-              <a:t> i inne przeglądarki</a:t>
-            </a:r>
-          </a:p>
-        </p:txBody>
-      </p:sp>
-    </p:spTree>
-    <p:extLst>
-      <p:ext uri="{BB962C8B-B14F-4D97-AF65-F5344CB8AC3E}">
-        <p14:creationId xmlns:p14="http://schemas.microsoft.com/office/powerpoint/2010/main" val="3022742935"/>
-      </p:ext>
-    </p:extLst>
-  </p:cSld>
-  <p:clrMapOvr>
-    <a:masterClrMapping/>
-  </p:clrMapOvr>
-  <p:timing>
-    <p:tnLst>
-      <p:par>
-        <p:cTn id="1" dur="indefinite" restart="never" nodeType="tmRoot">
-          <p:childTnLst>
-            <p:seq concurrent="1" nextAc="seek">
-              <p:cTn id="2" dur="indefinite" nodeType="mainSeq">
-                <p:childTnLst>
-                  <p:par>
-                    <p:cTn id="3" fill="hold">
-                      <p:stCondLst>
-                        <p:cond delay="indefinite"/>
-                      </p:stCondLst>
-                      <p:childTnLst>
-                        <p:par>
-                          <p:cTn id="4" fill="hold">
-                            <p:stCondLst>
-                              <p:cond delay="0"/>
-                            </p:stCondLst>
-                            <p:childTnLst>
-                              <p:par>
-                                <p:cTn id="5" presetID="10" presetClass="entr" presetSubtype="0" fill="hold" grpId="0" nodeType="clickEffect">
-                                  <p:stCondLst>
-                                    <p:cond delay="0"/>
-                                  </p:stCondLst>
-                                  <p:childTnLst>
-                                    <p:set>
-                                      <p:cBhvr>
-                                        <p:cTn id="6" dur="1" fill="hold">
-                                          <p:stCondLst>
-                                            <p:cond delay="0"/>
-                                          </p:stCondLst>
-                                        </p:cTn>
-                                        <p:tgtEl>
-                                          <p:spTgt spid="14">
-                                            <p:txEl>
-                                              <p:pRg st="0" end="0"/>
-                                            </p:txEl>
-                                          </p:spTgt>
-                                        </p:tgtEl>
-                                        <p:attrNameLst>
-                                          <p:attrName>style.visibility</p:attrName>
-                                        </p:attrNameLst>
-                                      </p:cBhvr>
-                                      <p:to>
-                                        <p:strVal val="visible"/>
-                                      </p:to>
-                                    </p:set>
-                                    <p:animEffect transition="in" filter="fade">
-                                      <p:cBhvr>
-                                        <p:cTn id="7" dur="500"/>
-                                        <p:tgtEl>
-                                          <p:spTgt spid="14">
-                                            <p:txEl>
-                                              <p:pRg st="0" end="0"/>
-                                            </p:txEl>
-                                          </p:spTgt>
-                                        </p:tgtEl>
-                                      </p:cBhvr>
-                                    </p:animEffect>
-                                  </p:childTnLst>
-                                </p:cTn>
-                              </p:par>
-                            </p:childTnLst>
-                          </p:cTn>
-                        </p:par>
-                      </p:childTnLst>
-                    </p:cTn>
-                  </p:par>
-                  <p:par>
-                    <p:cTn id="8" fill="hold">
-                      <p:stCondLst>
-                        <p:cond delay="indefinite"/>
-                      </p:stCondLst>
-                      <p:childTnLst>
-                        <p:par>
-                          <p:cTn id="9" fill="hold">
-                            <p:stCondLst>
-                              <p:cond delay="0"/>
-                            </p:stCondLst>
-                            <p:childTnLst>
-                              <p:par>
-                                <p:cTn id="10" presetID="10" presetClass="entr" presetSubtype="0" fill="hold" grpId="0" nodeType="clickEffect">
-                                  <p:stCondLst>
-                                    <p:cond delay="0"/>
-                                  </p:stCondLst>
-                                  <p:childTnLst>
-                                    <p:set>
-                                      <p:cBhvr>
-                                        <p:cTn id="11" dur="1" fill="hold">
-                                          <p:stCondLst>
-                                            <p:cond delay="0"/>
-                                          </p:stCondLst>
-                                        </p:cTn>
-                                        <p:tgtEl>
-                                          <p:spTgt spid="14">
-                                            <p:txEl>
-                                              <p:pRg st="1" end="1"/>
-                                            </p:txEl>
-                                          </p:spTgt>
-                                        </p:tgtEl>
-                                        <p:attrNameLst>
-                                          <p:attrName>style.visibility</p:attrName>
-                                        </p:attrNameLst>
-                                      </p:cBhvr>
-                                      <p:to>
-                                        <p:strVal val="visible"/>
-                                      </p:to>
-                                    </p:set>
-                                    <p:animEffect transition="in" filter="fade">
-                                      <p:cBhvr>
-                                        <p:cTn id="12" dur="500"/>
-                                        <p:tgtEl>
-                                          <p:spTgt spid="14">
-                                            <p:txEl>
-                                              <p:pRg st="1" end="1"/>
-                                            </p:txEl>
-                                          </p:spTgt>
-                                        </p:tgtEl>
-                                      </p:cBhvr>
-                                    </p:animEffect>
-                                  </p:childTnLst>
-                                </p:cTn>
-                              </p:par>
-                            </p:childTnLst>
-                          </p:cTn>
-                        </p:par>
-                      </p:childTnLst>
-                    </p:cTn>
-                  </p:par>
-                  <p:par>
-                    <p:cTn id="13" fill="hold">
-                      <p:stCondLst>
-                        <p:cond delay="indefinite"/>
-                      </p:stCondLst>
-                      <p:childTnLst>
-                        <p:par>
-                          <p:cTn id="14" fill="hold">
-                            <p:stCondLst>
-                              <p:cond delay="0"/>
-                            </p:stCondLst>
-                            <p:childTnLst>
-                              <p:par>
-                                <p:cTn id="15" presetID="10" presetClass="entr" presetSubtype="0" fill="hold" grpId="0" nodeType="clickEffect">
-                                  <p:stCondLst>
-                                    <p:cond delay="0"/>
-                                  </p:stCondLst>
-                                  <p:childTnLst>
-                                    <p:set>
-                                      <p:cBhvr>
-                                        <p:cTn id="16" dur="1" fill="hold">
-                                          <p:stCondLst>
-                                            <p:cond delay="0"/>
-                                          </p:stCondLst>
-                                        </p:cTn>
-                                        <p:tgtEl>
-                                          <p:spTgt spid="14">
-                                            <p:txEl>
-                                              <p:pRg st="2" end="2"/>
-                                            </p:txEl>
-                                          </p:spTgt>
-                                        </p:tgtEl>
-                                        <p:attrNameLst>
-                                          <p:attrName>style.visibility</p:attrName>
-                                        </p:attrNameLst>
-                                      </p:cBhvr>
-                                      <p:to>
-                                        <p:strVal val="visible"/>
-                                      </p:to>
-                                    </p:set>
-                                    <p:animEffect transition="in" filter="fade">
-                                      <p:cBhvr>
-                                        <p:cTn id="17" dur="500"/>
-                                        <p:tgtEl>
-                                          <p:spTgt spid="14">
-                                            <p:txEl>
-                                              <p:pRg st="2" end="2"/>
-                                            </p:txEl>
-                                          </p:spTgt>
-                                        </p:tgtEl>
-                                      </p:cBhvr>
-                                    </p:animEffect>
-                                  </p:childTnLst>
-                                </p:cTn>
-                              </p:par>
-                            </p:childTnLst>
-                          </p:cTn>
-                        </p:par>
-                      </p:childTnLst>
-                    </p:cTn>
-                  </p:par>
-                  <p:par>
-                    <p:cTn id="18" fill="hold">
-                      <p:stCondLst>
-                        <p:cond delay="indefinite"/>
-                      </p:stCondLst>
-                      <p:childTnLst>
-                        <p:par>
-                          <p:cTn id="19" fill="hold">
-                            <p:stCondLst>
-                              <p:cond delay="0"/>
-                            </p:stCondLst>
-                            <p:childTnLst>
-                              <p:par>
-                                <p:cTn id="20" presetID="10" presetClass="entr" presetSubtype="0" fill="hold" grpId="0" nodeType="clickEffect">
-                                  <p:stCondLst>
-                                    <p:cond delay="0"/>
-                                  </p:stCondLst>
-                                  <p:childTnLst>
-                                    <p:set>
-                                      <p:cBhvr>
-                                        <p:cTn id="21" dur="1" fill="hold">
-                                          <p:stCondLst>
-                                            <p:cond delay="0"/>
-                                          </p:stCondLst>
-                                        </p:cTn>
-                                        <p:tgtEl>
-                                          <p:spTgt spid="14">
-                                            <p:txEl>
-                                              <p:pRg st="3" end="3"/>
-                                            </p:txEl>
-                                          </p:spTgt>
-                                        </p:tgtEl>
-                                        <p:attrNameLst>
-                                          <p:attrName>style.visibility</p:attrName>
-                                        </p:attrNameLst>
-                                      </p:cBhvr>
-                                      <p:to>
-                                        <p:strVal val="visible"/>
-                                      </p:to>
-                                    </p:set>
-                                    <p:animEffect transition="in" filter="fade">
-                                      <p:cBhvr>
-                                        <p:cTn id="22" dur="500"/>
-                                        <p:tgtEl>
-                                          <p:spTgt spid="14">
-                                            <p:txEl>
-                                              <p:pRg st="3" end="3"/>
-                                            </p:txEl>
-                                          </p:spTgt>
-                                        </p:tgtEl>
-                                      </p:cBhvr>
-                                    </p:animEffect>
-                                  </p:childTnLst>
-                                </p:cTn>
-                              </p:par>
-                            </p:childTnLst>
-                          </p:cTn>
-                        </p:par>
-                      </p:childTnLst>
-                    </p:cTn>
-                  </p:par>
-                  <p:par>
-                    <p:cTn id="23" fill="hold">
-                      <p:stCondLst>
-                        <p:cond delay="indefinite"/>
-                      </p:stCondLst>
-                      <p:childTnLst>
-                        <p:par>
-                          <p:cTn id="24" fill="hold">
-                            <p:stCondLst>
-                              <p:cond delay="0"/>
-                            </p:stCondLst>
-                            <p:childTnLst>
-                              <p:par>
-                                <p:cTn id="25" presetID="10" presetClass="entr" presetSubtype="0" fill="hold" grpId="0" nodeType="clickEffect">
-                                  <p:stCondLst>
-                                    <p:cond delay="0"/>
-                                  </p:stCondLst>
-                                  <p:childTnLst>
-                                    <p:set>
-                                      <p:cBhvr>
-                                        <p:cTn id="26" dur="1" fill="hold">
-                                          <p:stCondLst>
-                                            <p:cond delay="0"/>
-                                          </p:stCondLst>
-                                        </p:cTn>
-                                        <p:tgtEl>
-                                          <p:spTgt spid="14">
-                                            <p:txEl>
-                                              <p:pRg st="4" end="4"/>
-                                            </p:txEl>
-                                          </p:spTgt>
-                                        </p:tgtEl>
-                                        <p:attrNameLst>
-                                          <p:attrName>style.visibility</p:attrName>
-                                        </p:attrNameLst>
-                                      </p:cBhvr>
-                                      <p:to>
-                                        <p:strVal val="visible"/>
-                                      </p:to>
-                                    </p:set>
-                                    <p:animEffect transition="in" filter="fade">
-                                      <p:cBhvr>
-                                        <p:cTn id="27" dur="500"/>
-                                        <p:tgtEl>
-                                          <p:spTgt spid="14">
-                                            <p:txEl>
-                                              <p:pRg st="4" end="4"/>
-                                            </p:txEl>
-                                          </p:spTgt>
-                                        </p:tgtEl>
-                                      </p:cBhvr>
-                                    </p:animEffect>
-                                  </p:childTnLst>
-                                </p:cTn>
-                              </p:par>
-                            </p:childTnLst>
-                          </p:cTn>
-                        </p:par>
-                      </p:childTnLst>
-                    </p:cTn>
-                  </p:par>
-                </p:childTnLst>
-              </p:cTn>
-              <p:prevCondLst>
-                <p:cond evt="onPrev" delay="0">
-                  <p:tgtEl>
-                    <p:sldTgt/>
-                  </p:tgtEl>
-                </p:cond>
-              </p:prevCondLst>
-              <p:nextCondLst>
-                <p:cond evt="onNext" delay="0">
-                  <p:tgtEl>
-                    <p:sldTgt/>
-                  </p:tgtEl>
-                </p:cond>
-              </p:nextCondLst>
-            </p:seq>
-          </p:childTnLst>
-        </p:cTn>
-      </p:par>
-    </p:tnLst>
-    <p:bldLst>
-      <p:bldP spid="14" grpId="0" build="p"/>
     </p:bldLst>
   </p:timing>
 </p:sld>

</xml_diff>

<commit_message>
Minor opening slide tweak
</commit_message>
<xml_diff>
--- a/presentation.pptx
+++ b/presentation.pptx
@@ -2886,7 +2886,7 @@
           <a:p>
             <a:fld id="{E0FD4FC0-A908-4AF9-A685-AE949B61EE1D}" type="datetimeFigureOut">
               <a:rPr lang="pl-PL" smtClean="0"/>
-              <a:t>2013-02-10</a:t>
+              <a:t>2013-02-12</a:t>
             </a:fld>
             <a:endParaRPr lang="pl-PL"/>
           </a:p>
@@ -7513,19 +7513,7 @@
                 <a:ea typeface="+mn-ea"/>
                 <a:cs typeface="+mn-cs"/>
               </a:rPr>
-              <a:t>Podejście </a:t>
-            </a:r>
-            <a:r>
-              <a:rPr lang="pl-PL" sz="1200" b="0" i="0" kern="1200" dirty="0" smtClean="0">
-                <a:solidFill>
-                  <a:schemeClr val="tx1"/>
-                </a:solidFill>
-                <a:effectLst/>
-                <a:latin typeface="+mn-lt"/>
-                <a:ea typeface="+mn-ea"/>
-                <a:cs typeface="+mn-cs"/>
-              </a:rPr>
-              <a:t>oparte o cały zespół</a:t>
+              <a:t>Podejście oparte o cały zespół</a:t>
             </a:r>
           </a:p>
           <a:p>
@@ -8697,7 +8685,7 @@
           <a:p>
             <a:fld id="{D30BB303-ADEB-436F-8582-99928D5EC1B6}" type="datetimeFigureOut">
               <a:rPr lang="pl-PL" smtClean="0"/>
-              <a:t>2013-02-10</a:t>
+              <a:t>2013-02-12</a:t>
             </a:fld>
             <a:endParaRPr lang="pl-PL"/>
           </a:p>
@@ -8863,7 +8851,7 @@
           <a:p>
             <a:fld id="{D30BB303-ADEB-436F-8582-99928D5EC1B6}" type="datetimeFigureOut">
               <a:rPr lang="pl-PL" smtClean="0"/>
-              <a:t>2013-02-10</a:t>
+              <a:t>2013-02-12</a:t>
             </a:fld>
             <a:endParaRPr lang="pl-PL"/>
           </a:p>
@@ -9039,7 +9027,7 @@
           <a:p>
             <a:fld id="{D30BB303-ADEB-436F-8582-99928D5EC1B6}" type="datetimeFigureOut">
               <a:rPr lang="pl-PL" smtClean="0"/>
-              <a:t>2013-02-10</a:t>
+              <a:t>2013-02-12</a:t>
             </a:fld>
             <a:endParaRPr lang="pl-PL"/>
           </a:p>
@@ -9205,7 +9193,7 @@
           <a:p>
             <a:fld id="{D30BB303-ADEB-436F-8582-99928D5EC1B6}" type="datetimeFigureOut">
               <a:rPr lang="pl-PL" smtClean="0"/>
-              <a:t>2013-02-10</a:t>
+              <a:t>2013-02-12</a:t>
             </a:fld>
             <a:endParaRPr lang="pl-PL"/>
           </a:p>
@@ -9447,7 +9435,7 @@
           <a:p>
             <a:fld id="{D30BB303-ADEB-436F-8582-99928D5EC1B6}" type="datetimeFigureOut">
               <a:rPr lang="pl-PL" smtClean="0"/>
-              <a:t>2013-02-10</a:t>
+              <a:t>2013-02-12</a:t>
             </a:fld>
             <a:endParaRPr lang="pl-PL"/>
           </a:p>
@@ -9731,7 +9719,7 @@
           <a:p>
             <a:fld id="{D30BB303-ADEB-436F-8582-99928D5EC1B6}" type="datetimeFigureOut">
               <a:rPr lang="pl-PL" smtClean="0"/>
-              <a:t>2013-02-10</a:t>
+              <a:t>2013-02-12</a:t>
             </a:fld>
             <a:endParaRPr lang="pl-PL"/>
           </a:p>
@@ -10149,7 +10137,7 @@
           <a:p>
             <a:fld id="{D30BB303-ADEB-436F-8582-99928D5EC1B6}" type="datetimeFigureOut">
               <a:rPr lang="pl-PL" smtClean="0"/>
-              <a:t>2013-02-10</a:t>
+              <a:t>2013-02-12</a:t>
             </a:fld>
             <a:endParaRPr lang="pl-PL"/>
           </a:p>
@@ -10263,7 +10251,7 @@
           <a:p>
             <a:fld id="{D30BB303-ADEB-436F-8582-99928D5EC1B6}" type="datetimeFigureOut">
               <a:rPr lang="pl-PL" smtClean="0"/>
-              <a:t>2013-02-10</a:t>
+              <a:t>2013-02-12</a:t>
             </a:fld>
             <a:endParaRPr lang="pl-PL"/>
           </a:p>
@@ -10354,7 +10342,7 @@
           <a:p>
             <a:fld id="{D30BB303-ADEB-436F-8582-99928D5EC1B6}" type="datetimeFigureOut">
               <a:rPr lang="pl-PL" smtClean="0"/>
-              <a:t>2013-02-10</a:t>
+              <a:t>2013-02-12</a:t>
             </a:fld>
             <a:endParaRPr lang="pl-PL"/>
           </a:p>
@@ -10627,7 +10615,7 @@
           <a:p>
             <a:fld id="{D30BB303-ADEB-436F-8582-99928D5EC1B6}" type="datetimeFigureOut">
               <a:rPr lang="pl-PL" smtClean="0"/>
-              <a:t>2013-02-10</a:t>
+              <a:t>2013-02-12</a:t>
             </a:fld>
             <a:endParaRPr lang="pl-PL"/>
           </a:p>
@@ -10876,7 +10864,7 @@
           <a:p>
             <a:fld id="{D30BB303-ADEB-436F-8582-99928D5EC1B6}" type="datetimeFigureOut">
               <a:rPr lang="pl-PL" smtClean="0"/>
-              <a:t>2013-02-10</a:t>
+              <a:t>2013-02-12</a:t>
             </a:fld>
             <a:endParaRPr lang="pl-PL"/>
           </a:p>
@@ -11112,7 +11100,7 @@
           <a:p>
             <a:fld id="{D30BB303-ADEB-436F-8582-99928D5EC1B6}" type="datetimeFigureOut">
               <a:rPr lang="pl-PL" smtClean="0"/>
-              <a:t>2013-02-10</a:t>
+              <a:t>2013-02-12</a:t>
             </a:fld>
             <a:endParaRPr lang="pl-PL"/>
           </a:p>
@@ -11495,7 +11483,7 @@
         </p:nvSpPr>
         <p:spPr>
           <a:xfrm>
-            <a:off x="0" y="1889398"/>
+            <a:off x="0" y="1772816"/>
             <a:ext cx="9144000" cy="2619722"/>
           </a:xfrm>
         </p:spPr>
@@ -11507,8 +11495,13 @@
           <a:p>
             <a:r>
               <a:rPr lang="pl-PL" sz="5400" b="1" dirty="0"/>
-              <a:t>Najlepsze praktyki testowania aplikacji ASP.NET</a:t>
-            </a:r>
+              <a:t>Najlepsze praktyki testowania aplikacji </a:t>
+            </a:r>
+            <a:r>
+              <a:rPr lang="pl-PL" sz="5400" b="1" dirty="0" smtClean="0"/>
+              <a:t>ASP.NET</a:t>
+            </a:r>
+            <a:endParaRPr lang="pl-PL" sz="5400" b="1" dirty="0"/>
           </a:p>
         </p:txBody>
       </p:sp>
@@ -11524,8 +11517,8 @@
         </p:nvSpPr>
         <p:spPr>
           <a:xfrm>
-            <a:off x="0" y="4221088"/>
-            <a:ext cx="9144000" cy="1057672"/>
+            <a:off x="0" y="4077072"/>
+            <a:ext cx="9144000" cy="1224136"/>
           </a:xfrm>
         </p:spPr>
         <p:txBody>
@@ -11533,7 +11526,7 @@
           <a:lstStyle/>
           <a:p>
             <a:r>
-              <a:rPr lang="pl-PL" b="1" dirty="0" smtClean="0">
+              <a:rPr lang="pl-PL" b="1" spc="600" dirty="0" smtClean="0">
                 <a:solidFill>
                   <a:schemeClr val="tx1">
                     <a:lumMod val="65000"/>
@@ -11541,9 +11534,52 @@
                   </a:schemeClr>
                 </a:solidFill>
               </a:rPr>
-              <a:t>Marcin Daczkowski</a:t>
-            </a:r>
-            <a:endParaRPr lang="pl-PL" b="1" dirty="0">
+              <a:t>Marcin </a:t>
+            </a:r>
+            <a:r>
+              <a:rPr lang="pl-PL" b="1" spc="600" dirty="0" err="1" smtClean="0">
+                <a:solidFill>
+                  <a:schemeClr val="tx1">
+                    <a:lumMod val="65000"/>
+                    <a:lumOff val="35000"/>
+                  </a:schemeClr>
+                </a:solidFill>
+              </a:rPr>
+              <a:t>Daczkowski</a:t>
+            </a:r>
+            <a:endParaRPr lang="en-US" b="1" spc="600" dirty="0">
+              <a:solidFill>
+                <a:schemeClr val="tx1">
+                  <a:lumMod val="65000"/>
+                  <a:lumOff val="35000"/>
+                </a:schemeClr>
+              </a:solidFill>
+            </a:endParaRPr>
+          </a:p>
+          <a:p>
+            <a:r>
+              <a:rPr lang="en-US" sz="2200" spc="300" dirty="0">
+                <a:solidFill>
+                  <a:schemeClr val="tx1">
+                    <a:lumMod val="65000"/>
+                    <a:lumOff val="35000"/>
+                  </a:schemeClr>
+                </a:solidFill>
+              </a:rPr>
+              <a:t>d</a:t>
+            </a:r>
+            <a:r>
+              <a:rPr lang="en-US" sz="2200" spc="300" dirty="0" smtClean="0">
+                <a:solidFill>
+                  <a:schemeClr val="tx1">
+                    <a:lumMod val="65000"/>
+                    <a:lumOff val="35000"/>
+                  </a:schemeClr>
+                </a:solidFill>
+              </a:rPr>
+              <a:t>aczkowski.net/about</a:t>
+            </a:r>
+            <a:endParaRPr lang="pl-PL" sz="2200" spc="300" dirty="0">
               <a:solidFill>
                 <a:schemeClr val="tx1">
                   <a:lumMod val="65000"/>
@@ -11769,11 +11805,11 @@
   <p:clrMapOvr>
     <a:masterClrMapping/>
   </p:clrMapOvr>
-  <mc:AlternateContent xmlns:mc="http://schemas.openxmlformats.org/markup-compatibility/2006">
-    <mc:Choice xmlns:p14="http://schemas.microsoft.com/office/powerpoint/2010/main" Requires="p14">
+  <mc:AlternateContent xmlns:mc="http://schemas.openxmlformats.org/markup-compatibility/2006" xmlns:p14="http://schemas.microsoft.com/office/powerpoint/2010/main">
+    <mc:Choice Requires="p14">
       <p:transition spd="slow" p14:dur="2000"/>
     </mc:Choice>
-    <mc:Fallback>
+    <mc:Fallback xmlns="">
       <p:transition spd="slow"/>
     </mc:Fallback>
   </mc:AlternateContent>
@@ -12124,7 +12160,7 @@
               <a:buChar char="•"/>
             </a:pPr>
             <a:r>
-              <a:rPr lang="pl-PL" sz="3400" dirty="0"/>
+              <a:rPr lang="pl-PL" sz="3400" dirty="0" smtClean="0"/>
               <a:t>parametryzowany </a:t>
             </a:r>
             <a:r>
@@ -12148,7 +12184,11 @@
             </a:r>
             <a:r>
               <a:rPr lang="pl-PL" sz="3400" dirty="0" smtClean="0"/>
-              <a:t> Object dla poprzedniego testu</a:t>
+              <a:t> Object dla poprzedniego </a:t>
+            </a:r>
+            <a:r>
+              <a:rPr lang="pl-PL" sz="3400" dirty="0" smtClean="0"/>
+              <a:t>testu</a:t>
             </a:r>
             <a:endParaRPr lang="en-US" sz="3400" dirty="0" smtClean="0"/>
           </a:p>
@@ -15624,15 +15664,7 @@
             </a:pPr>
             <a:r>
               <a:rPr lang="pl-PL" sz="3400" dirty="0" smtClean="0"/>
-              <a:t>buduj </a:t>
-            </a:r>
-            <a:r>
-              <a:rPr lang="pl-PL" sz="3400" dirty="0" smtClean="0"/>
-              <a:t>testy stopniowo </a:t>
-            </a:r>
-            <a:r>
-              <a:rPr lang="pl-PL" sz="3400" dirty="0" smtClean="0"/>
-              <a:t>zacz</a:t>
+              <a:t>buduj testy stopniowo zacz</a:t>
             </a:r>
             <a:r>
               <a:rPr lang="en-US" sz="3400" dirty="0" smtClean="0"/>
@@ -15652,11 +15684,7 @@
             </a:r>
             <a:r>
               <a:rPr lang="pl-PL" sz="3400" dirty="0" smtClean="0"/>
-              <a:t>od </a:t>
-            </a:r>
-            <a:r>
-              <a:rPr lang="pl-PL" sz="3400" dirty="0" smtClean="0"/>
-              <a:t>„happy </a:t>
+              <a:t>od „happy </a:t>
             </a:r>
             <a:r>
               <a:rPr lang="pl-PL" sz="3400" dirty="0" err="1" smtClean="0"/>
@@ -15694,11 +15722,7 @@
             </a:pPr>
             <a:r>
               <a:rPr lang="pl-PL" sz="3400" dirty="0" smtClean="0"/>
-              <a:t>postaw </a:t>
-            </a:r>
-            <a:r>
-              <a:rPr lang="pl-PL" sz="3400" dirty="0" smtClean="0"/>
-              <a:t>na zespół</a:t>
+              <a:t>postaw na zespół</a:t>
             </a:r>
             <a:endParaRPr lang="pl-PL" sz="3400" dirty="0"/>
           </a:p>

</xml_diff>